<commit_message>
Updated the slide deck with RoundhousE, tSQLt, and SQL Test
</commit_message>
<xml_diff>
--- a/SlideDeck/AutomatedTesting_with_Databases.pptx
+++ b/SlideDeck/AutomatedTesting_with_Databases.pptx
@@ -5,28 +5,33 @@
     <p:sldMasterId id="2147483649" r:id="rId5"/>
   </p:sldMasterIdLst>
   <p:notesMasterIdLst>
-    <p:notesMasterId r:id="rId22"/>
+    <p:notesMasterId r:id="rId27"/>
   </p:notesMasterIdLst>
   <p:handoutMasterIdLst>
-    <p:handoutMasterId r:id="rId23"/>
+    <p:handoutMasterId r:id="rId28"/>
   </p:handoutMasterIdLst>
   <p:sldIdLst>
     <p:sldId id="784" r:id="rId6"/>
     <p:sldId id="830" r:id="rId7"/>
     <p:sldId id="826" r:id="rId8"/>
-    <p:sldId id="827" r:id="rId9"/>
-    <p:sldId id="828" r:id="rId10"/>
+    <p:sldId id="839" r:id="rId9"/>
+    <p:sldId id="827" r:id="rId10"/>
     <p:sldId id="829" r:id="rId11"/>
-    <p:sldId id="820" r:id="rId12"/>
-    <p:sldId id="831" r:id="rId13"/>
-    <p:sldId id="832" r:id="rId14"/>
-    <p:sldId id="821" r:id="rId15"/>
-    <p:sldId id="833" r:id="rId16"/>
-    <p:sldId id="834" r:id="rId17"/>
-    <p:sldId id="835" r:id="rId18"/>
-    <p:sldId id="813" r:id="rId19"/>
-    <p:sldId id="824" r:id="rId20"/>
-    <p:sldId id="825" r:id="rId21"/>
+    <p:sldId id="838" r:id="rId12"/>
+    <p:sldId id="828" r:id="rId13"/>
+    <p:sldId id="837" r:id="rId14"/>
+    <p:sldId id="820" r:id="rId15"/>
+    <p:sldId id="831" r:id="rId16"/>
+    <p:sldId id="832" r:id="rId17"/>
+    <p:sldId id="821" r:id="rId18"/>
+    <p:sldId id="833" r:id="rId19"/>
+    <p:sldId id="834" r:id="rId20"/>
+    <p:sldId id="835" r:id="rId21"/>
+    <p:sldId id="840" r:id="rId22"/>
+    <p:sldId id="813" r:id="rId23"/>
+    <p:sldId id="824" r:id="rId24"/>
+    <p:sldId id="825" r:id="rId25"/>
+    <p:sldId id="836" r:id="rId26"/>
   </p:sldIdLst>
   <p:sldSz cx="9144000" cy="6858000" type="screen4x3"/>
   <p:notesSz cx="6858000" cy="9144000"/>
@@ -247,7 +252,7 @@
             <a:fld id="{EA6D1A69-4642-440C-B4DA-A3DDEA39507F}" type="datetimeFigureOut">
               <a:rPr lang="en-US" smtClean="0"/>
               <a:pPr/>
-              <a:t>5/9/2012</a:t>
+              <a:t>5/11/2012</a:t>
             </a:fld>
             <a:endParaRPr lang="en-US"/>
           </a:p>
@@ -878,7 +883,111 @@
           <a:lstStyle/>
           <a:p>
             <a:pPr eaLnBrk="1" hangingPunct="1"/>
-            <a:endParaRPr lang="en-US" smtClean="0">
+            <a:r>
+              <a:rPr lang="en-US" dirty="0">
+                <a:latin typeface="Arial" pitchFamily="34" charset="0"/>
+                <a:ea typeface="ＭＳ Ｐゴシック" pitchFamily="34" charset="-128"/>
+              </a:rPr>
+              <a:t>The primary thing to know, we are talking about automated testing.</a:t>
+            </a:r>
+          </a:p>
+          <a:p>
+            <a:pPr eaLnBrk="1" hangingPunct="1"/>
+            <a:endParaRPr lang="en-US" dirty="0">
+              <a:latin typeface="Arial" pitchFamily="34" charset="0"/>
+              <a:ea typeface="ＭＳ Ｐゴシック" pitchFamily="34" charset="-128"/>
+            </a:endParaRPr>
+          </a:p>
+          <a:p>
+            <a:pPr eaLnBrk="1" hangingPunct="1"/>
+            <a:r>
+              <a:rPr lang="en-US" dirty="0">
+                <a:latin typeface="Arial" pitchFamily="34" charset="0"/>
+                <a:ea typeface="ＭＳ Ｐゴシック" pitchFamily="34" charset="-128"/>
+              </a:rPr>
+              <a:t>Automated testing implies:</a:t>
+            </a:r>
+          </a:p>
+          <a:p>
+            <a:pPr marL="228600" indent="-228600" eaLnBrk="1" hangingPunct="1">
+              <a:buAutoNum type="arabicPeriod"/>
+            </a:pPr>
+            <a:r>
+              <a:rPr lang="en-US" dirty="0">
+                <a:latin typeface="Arial" pitchFamily="34" charset="0"/>
+                <a:ea typeface="ＭＳ Ｐゴシック" pitchFamily="34" charset="-128"/>
+              </a:rPr>
+              <a:t>Require zero setup or configuration, or only one-time setup and configuration</a:t>
+            </a:r>
+          </a:p>
+          <a:p>
+            <a:pPr marL="228600" indent="-228600" eaLnBrk="1" hangingPunct="1">
+              <a:buAutoNum type="arabicPeriod"/>
+            </a:pPr>
+            <a:r>
+              <a:rPr lang="en-US" dirty="0">
+                <a:latin typeface="Arial" pitchFamily="34" charset="0"/>
+                <a:ea typeface="ＭＳ Ｐゴシック" pitchFamily="34" charset="-128"/>
+              </a:rPr>
+              <a:t>Every test is isolated from every other test</a:t>
+            </a:r>
+          </a:p>
+          <a:p>
+            <a:pPr marL="228600" indent="-228600" eaLnBrk="1" hangingPunct="1">
+              <a:buAutoNum type="arabicPeriod"/>
+            </a:pPr>
+            <a:r>
+              <a:rPr lang="en-US" dirty="0">
+                <a:latin typeface="Arial" pitchFamily="34" charset="0"/>
+                <a:ea typeface="ＭＳ Ｐゴシック" pitchFamily="34" charset="-128"/>
+              </a:rPr>
+              <a:t>This is expectation that one or more tests run in a specific order</a:t>
+            </a:r>
+          </a:p>
+          <a:p>
+            <a:pPr marL="228600" indent="-228600" eaLnBrk="1" hangingPunct="1">
+              <a:buAutoNum type="arabicPeriod"/>
+            </a:pPr>
+            <a:r>
+              <a:rPr lang="en-US" dirty="0">
+                <a:latin typeface="Arial" pitchFamily="34" charset="0"/>
+                <a:ea typeface="ＭＳ Ｐゴシック" pitchFamily="34" charset="-128"/>
+              </a:rPr>
+              <a:t>Once initiated, the tests can all run to completion, unattended</a:t>
+            </a:r>
+          </a:p>
+          <a:p>
+            <a:pPr marL="228600" indent="-228600" eaLnBrk="1" hangingPunct="1">
+              <a:buAutoNum type="arabicPeriod"/>
+            </a:pPr>
+            <a:r>
+              <a:rPr lang="en-US" dirty="0">
+                <a:latin typeface="Arial" pitchFamily="34" charset="0"/>
+                <a:ea typeface="ＭＳ Ｐゴシック" pitchFamily="34" charset="-128"/>
+              </a:rPr>
+              <a:t>The tests result in either a pass or fail (or a defined status)</a:t>
+            </a:r>
+          </a:p>
+          <a:p>
+            <a:pPr eaLnBrk="1" hangingPunct="1"/>
+            <a:endParaRPr lang="en-US" dirty="0">
+              <a:latin typeface="Arial" pitchFamily="34" charset="0"/>
+              <a:ea typeface="ＭＳ Ｐゴシック" pitchFamily="34" charset="-128"/>
+            </a:endParaRPr>
+          </a:p>
+          <a:p>
+            <a:pPr eaLnBrk="1" hangingPunct="1"/>
+            <a:r>
+              <a:rPr lang="en-US" dirty="0">
+                <a:latin typeface="Arial" pitchFamily="34" charset="0"/>
+                <a:ea typeface="ＭＳ Ｐゴシック" pitchFamily="34" charset="-128"/>
+              </a:rPr>
+              <a:t>For this presentation, we create a local database on an instance of SQL Express. This is a one-time setup that provides isolation.</a:t>
+            </a:r>
+          </a:p>
+          <a:p>
+            <a:pPr eaLnBrk="1" hangingPunct="1"/>
+            <a:endParaRPr lang="en-US" dirty="0" smtClean="0">
               <a:latin typeface="Arial" pitchFamily="34" charset="0"/>
               <a:ea typeface="ＭＳ Ｐゴシック" pitchFamily="34" charset="-128"/>
             </a:endParaRPr>
@@ -973,7 +1082,7 @@
     </p:spTree>
     <p:extLst>
       <p:ext uri="{BB962C8B-B14F-4D97-AF65-F5344CB8AC3E}">
-        <p14:creationId xmlns:p14="http://schemas.microsoft.com/office/powerpoint/2010/main" val="449006030"/>
+        <p14:creationId xmlns:p14="http://schemas.microsoft.com/office/powerpoint/2010/main" val="2859476021"/>
       </p:ext>
     </p:extLst>
   </p:cSld>
@@ -1063,7 +1172,7 @@
     </p:spTree>
     <p:extLst>
       <p:ext uri="{BB962C8B-B14F-4D97-AF65-F5344CB8AC3E}">
-        <p14:creationId xmlns:p14="http://schemas.microsoft.com/office/powerpoint/2010/main" val="305792766"/>
+        <p14:creationId xmlns:p14="http://schemas.microsoft.com/office/powerpoint/2010/main" val="744993139"/>
       </p:ext>
     </p:extLst>
   </p:cSld>
@@ -1153,7 +1262,7 @@
     </p:spTree>
     <p:extLst>
       <p:ext uri="{BB962C8B-B14F-4D97-AF65-F5344CB8AC3E}">
-        <p14:creationId xmlns:p14="http://schemas.microsoft.com/office/powerpoint/2010/main" val="1500808978"/>
+        <p14:creationId xmlns:p14="http://schemas.microsoft.com/office/powerpoint/2010/main" val="3804378049"/>
       </p:ext>
     </p:extLst>
   </p:cSld>
@@ -1243,7 +1352,7 @@
     </p:spTree>
     <p:extLst>
       <p:ext uri="{BB962C8B-B14F-4D97-AF65-F5344CB8AC3E}">
-        <p14:creationId xmlns:p14="http://schemas.microsoft.com/office/powerpoint/2010/main" val="2981442034"/>
+        <p14:creationId xmlns:p14="http://schemas.microsoft.com/office/powerpoint/2010/main" val="449006030"/>
       </p:ext>
     </p:extLst>
   </p:cSld>
@@ -1333,7 +1442,7 @@
     </p:spTree>
     <p:extLst>
       <p:ext uri="{BB962C8B-B14F-4D97-AF65-F5344CB8AC3E}">
-        <p14:creationId xmlns:p14="http://schemas.microsoft.com/office/powerpoint/2010/main" val="635701735"/>
+        <p14:creationId xmlns:p14="http://schemas.microsoft.com/office/powerpoint/2010/main" val="305792766"/>
       </p:ext>
     </p:extLst>
   </p:cSld>
@@ -1423,7 +1532,7 @@
     </p:spTree>
     <p:extLst>
       <p:ext uri="{BB962C8B-B14F-4D97-AF65-F5344CB8AC3E}">
-        <p14:creationId xmlns:p14="http://schemas.microsoft.com/office/powerpoint/2010/main" val="2912008100"/>
+        <p14:creationId xmlns:p14="http://schemas.microsoft.com/office/powerpoint/2010/main" val="1500808978"/>
       </p:ext>
     </p:extLst>
   </p:cSld>
@@ -1505,6 +1614,276 @@
                 <a:defRPr/>
               </a:pPr>
               <a:t>16</a:t>
+            </a:fld>
+            <a:endParaRPr lang="en-US" dirty="0"/>
+          </a:p>
+        </p:txBody>
+      </p:sp>
+    </p:spTree>
+    <p:extLst>
+      <p:ext uri="{BB962C8B-B14F-4D97-AF65-F5344CB8AC3E}">
+        <p14:creationId xmlns:p14="http://schemas.microsoft.com/office/powerpoint/2010/main" val="2981442034"/>
+      </p:ext>
+    </p:extLst>
+  </p:cSld>
+  <p:clrMapOvr>
+    <a:masterClrMapping/>
+  </p:clrMapOvr>
+</p:notes>
+</file>
+
+<file path=ppt/notesSlides/notesSlide17.xml><?xml version="1.0" encoding="utf-8"?>
+<p:notes xmlns:a="http://schemas.openxmlformats.org/drawingml/2006/main" xmlns:r="http://schemas.openxmlformats.org/officeDocument/2006/relationships" xmlns:p="http://schemas.openxmlformats.org/presentationml/2006/main">
+  <p:cSld>
+    <p:spTree>
+      <p:nvGrpSpPr>
+        <p:cNvPr id="1" name=""/>
+        <p:cNvGrpSpPr/>
+        <p:nvPr/>
+      </p:nvGrpSpPr>
+      <p:grpSpPr>
+        <a:xfrm>
+          <a:off x="0" y="0"/>
+          <a:ext cx="0" cy="0"/>
+          <a:chOff x="0" y="0"/>
+          <a:chExt cx="0" cy="0"/>
+        </a:xfrm>
+      </p:grpSpPr>
+      <p:sp>
+        <p:nvSpPr>
+          <p:cNvPr id="2" name="Slide Image Placeholder 1"/>
+          <p:cNvSpPr>
+            <a:spLocks noGrp="1" noRot="1" noChangeAspect="1"/>
+          </p:cNvSpPr>
+          <p:nvPr>
+            <p:ph type="sldImg"/>
+          </p:nvPr>
+        </p:nvSpPr>
+        <p:spPr/>
+      </p:sp>
+      <p:sp>
+        <p:nvSpPr>
+          <p:cNvPr id="3" name="Notes Placeholder 2"/>
+          <p:cNvSpPr>
+            <a:spLocks noGrp="1"/>
+          </p:cNvSpPr>
+          <p:nvPr>
+            <p:ph type="body" idx="1"/>
+          </p:nvPr>
+        </p:nvSpPr>
+        <p:spPr/>
+        <p:txBody>
+          <a:bodyPr/>
+          <a:lstStyle/>
+          <a:p>
+            <a:endParaRPr lang="en-US"/>
+          </a:p>
+        </p:txBody>
+      </p:sp>
+      <p:sp>
+        <p:nvSpPr>
+          <p:cNvPr id="4" name="Slide Number Placeholder 3"/>
+          <p:cNvSpPr>
+            <a:spLocks noGrp="1"/>
+          </p:cNvSpPr>
+          <p:nvPr>
+            <p:ph type="sldNum" sz="quarter" idx="10"/>
+          </p:nvPr>
+        </p:nvSpPr>
+        <p:spPr/>
+        <p:txBody>
+          <a:bodyPr/>
+          <a:lstStyle/>
+          <a:p>
+            <a:pPr>
+              <a:defRPr/>
+            </a:pPr>
+            <a:fld id="{6122490E-C14D-4509-A7F9-FC7223F2C851}" type="slidenum">
+              <a:rPr lang="en-US" smtClean="0"/>
+              <a:pPr>
+                <a:defRPr/>
+              </a:pPr>
+              <a:t>18</a:t>
+            </a:fld>
+            <a:endParaRPr lang="en-US" dirty="0"/>
+          </a:p>
+        </p:txBody>
+      </p:sp>
+    </p:spTree>
+    <p:extLst>
+      <p:ext uri="{BB962C8B-B14F-4D97-AF65-F5344CB8AC3E}">
+        <p14:creationId xmlns:p14="http://schemas.microsoft.com/office/powerpoint/2010/main" val="635701735"/>
+      </p:ext>
+    </p:extLst>
+  </p:cSld>
+  <p:clrMapOvr>
+    <a:masterClrMapping/>
+  </p:clrMapOvr>
+</p:notes>
+</file>
+
+<file path=ppt/notesSlides/notesSlide18.xml><?xml version="1.0" encoding="utf-8"?>
+<p:notes xmlns:a="http://schemas.openxmlformats.org/drawingml/2006/main" xmlns:r="http://schemas.openxmlformats.org/officeDocument/2006/relationships" xmlns:p="http://schemas.openxmlformats.org/presentationml/2006/main">
+  <p:cSld>
+    <p:spTree>
+      <p:nvGrpSpPr>
+        <p:cNvPr id="1" name=""/>
+        <p:cNvGrpSpPr/>
+        <p:nvPr/>
+      </p:nvGrpSpPr>
+      <p:grpSpPr>
+        <a:xfrm>
+          <a:off x="0" y="0"/>
+          <a:ext cx="0" cy="0"/>
+          <a:chOff x="0" y="0"/>
+          <a:chExt cx="0" cy="0"/>
+        </a:xfrm>
+      </p:grpSpPr>
+      <p:sp>
+        <p:nvSpPr>
+          <p:cNvPr id="2" name="Slide Image Placeholder 1"/>
+          <p:cNvSpPr>
+            <a:spLocks noGrp="1" noRot="1" noChangeAspect="1"/>
+          </p:cNvSpPr>
+          <p:nvPr>
+            <p:ph type="sldImg"/>
+          </p:nvPr>
+        </p:nvSpPr>
+        <p:spPr/>
+      </p:sp>
+      <p:sp>
+        <p:nvSpPr>
+          <p:cNvPr id="3" name="Notes Placeholder 2"/>
+          <p:cNvSpPr>
+            <a:spLocks noGrp="1"/>
+          </p:cNvSpPr>
+          <p:nvPr>
+            <p:ph type="body" idx="1"/>
+          </p:nvPr>
+        </p:nvSpPr>
+        <p:spPr/>
+        <p:txBody>
+          <a:bodyPr/>
+          <a:lstStyle/>
+          <a:p>
+            <a:endParaRPr lang="en-US"/>
+          </a:p>
+        </p:txBody>
+      </p:sp>
+      <p:sp>
+        <p:nvSpPr>
+          <p:cNvPr id="4" name="Slide Number Placeholder 3"/>
+          <p:cNvSpPr>
+            <a:spLocks noGrp="1"/>
+          </p:cNvSpPr>
+          <p:nvPr>
+            <p:ph type="sldNum" sz="quarter" idx="10"/>
+          </p:nvPr>
+        </p:nvSpPr>
+        <p:spPr/>
+        <p:txBody>
+          <a:bodyPr/>
+          <a:lstStyle/>
+          <a:p>
+            <a:pPr>
+              <a:defRPr/>
+            </a:pPr>
+            <a:fld id="{6122490E-C14D-4509-A7F9-FC7223F2C851}" type="slidenum">
+              <a:rPr lang="en-US" smtClean="0"/>
+              <a:pPr>
+                <a:defRPr/>
+              </a:pPr>
+              <a:t>19</a:t>
+            </a:fld>
+            <a:endParaRPr lang="en-US" dirty="0"/>
+          </a:p>
+        </p:txBody>
+      </p:sp>
+    </p:spTree>
+    <p:extLst>
+      <p:ext uri="{BB962C8B-B14F-4D97-AF65-F5344CB8AC3E}">
+        <p14:creationId xmlns:p14="http://schemas.microsoft.com/office/powerpoint/2010/main" val="2912008100"/>
+      </p:ext>
+    </p:extLst>
+  </p:cSld>
+  <p:clrMapOvr>
+    <a:masterClrMapping/>
+  </p:clrMapOvr>
+</p:notes>
+</file>
+
+<file path=ppt/notesSlides/notesSlide19.xml><?xml version="1.0" encoding="utf-8"?>
+<p:notes xmlns:a="http://schemas.openxmlformats.org/drawingml/2006/main" xmlns:r="http://schemas.openxmlformats.org/officeDocument/2006/relationships" xmlns:p="http://schemas.openxmlformats.org/presentationml/2006/main">
+  <p:cSld>
+    <p:spTree>
+      <p:nvGrpSpPr>
+        <p:cNvPr id="1" name=""/>
+        <p:cNvGrpSpPr/>
+        <p:nvPr/>
+      </p:nvGrpSpPr>
+      <p:grpSpPr>
+        <a:xfrm>
+          <a:off x="0" y="0"/>
+          <a:ext cx="0" cy="0"/>
+          <a:chOff x="0" y="0"/>
+          <a:chExt cx="0" cy="0"/>
+        </a:xfrm>
+      </p:grpSpPr>
+      <p:sp>
+        <p:nvSpPr>
+          <p:cNvPr id="2" name="Slide Image Placeholder 1"/>
+          <p:cNvSpPr>
+            <a:spLocks noGrp="1" noRot="1" noChangeAspect="1"/>
+          </p:cNvSpPr>
+          <p:nvPr>
+            <p:ph type="sldImg"/>
+          </p:nvPr>
+        </p:nvSpPr>
+        <p:spPr/>
+      </p:sp>
+      <p:sp>
+        <p:nvSpPr>
+          <p:cNvPr id="3" name="Notes Placeholder 2"/>
+          <p:cNvSpPr>
+            <a:spLocks noGrp="1"/>
+          </p:cNvSpPr>
+          <p:nvPr>
+            <p:ph type="body" idx="1"/>
+          </p:nvPr>
+        </p:nvSpPr>
+        <p:spPr/>
+        <p:txBody>
+          <a:bodyPr/>
+          <a:lstStyle/>
+          <a:p>
+            <a:endParaRPr lang="en-US"/>
+          </a:p>
+        </p:txBody>
+      </p:sp>
+      <p:sp>
+        <p:nvSpPr>
+          <p:cNvPr id="4" name="Slide Number Placeholder 3"/>
+          <p:cNvSpPr>
+            <a:spLocks noGrp="1"/>
+          </p:cNvSpPr>
+          <p:nvPr>
+            <p:ph type="sldNum" sz="quarter" idx="10"/>
+          </p:nvPr>
+        </p:nvSpPr>
+        <p:spPr/>
+        <p:txBody>
+          <a:bodyPr/>
+          <a:lstStyle/>
+          <a:p>
+            <a:pPr>
+              <a:defRPr/>
+            </a:pPr>
+            <a:fld id="{6122490E-C14D-4509-A7F9-FC7223F2C851}" type="slidenum">
+              <a:rPr lang="en-US" smtClean="0"/>
+              <a:pPr>
+                <a:defRPr/>
+              </a:pPr>
+              <a:t>20</a:t>
             </a:fld>
             <a:endParaRPr lang="en-US" dirty="0"/>
           </a:p>
@@ -1567,7 +1946,11 @@
           <a:bodyPr/>
           <a:lstStyle/>
           <a:p>
-            <a:endParaRPr lang="en-US"/>
+            <a:r>
+              <a:rPr lang="en-US" dirty="0"/>
+              <a:t>Introductory remarks.</a:t>
+            </a:r>
+            <a:endParaRPr lang="en-US" dirty="0"/>
           </a:p>
         </p:txBody>
       </p:sp>
@@ -1604,6 +1987,96 @@
     <p:extLst>
       <p:ext uri="{BB962C8B-B14F-4D97-AF65-F5344CB8AC3E}">
         <p14:creationId xmlns:p14="http://schemas.microsoft.com/office/powerpoint/2010/main" val="242402899"/>
+      </p:ext>
+    </p:extLst>
+  </p:cSld>
+  <p:clrMapOvr>
+    <a:masterClrMapping/>
+  </p:clrMapOvr>
+</p:notes>
+</file>
+
+<file path=ppt/notesSlides/notesSlide20.xml><?xml version="1.0" encoding="utf-8"?>
+<p:notes xmlns:a="http://schemas.openxmlformats.org/drawingml/2006/main" xmlns:r="http://schemas.openxmlformats.org/officeDocument/2006/relationships" xmlns:p="http://schemas.openxmlformats.org/presentationml/2006/main">
+  <p:cSld>
+    <p:spTree>
+      <p:nvGrpSpPr>
+        <p:cNvPr id="1" name=""/>
+        <p:cNvGrpSpPr/>
+        <p:nvPr/>
+      </p:nvGrpSpPr>
+      <p:grpSpPr>
+        <a:xfrm>
+          <a:off x="0" y="0"/>
+          <a:ext cx="0" cy="0"/>
+          <a:chOff x="0" y="0"/>
+          <a:chExt cx="0" cy="0"/>
+        </a:xfrm>
+      </p:grpSpPr>
+      <p:sp>
+        <p:nvSpPr>
+          <p:cNvPr id="2" name="Slide Image Placeholder 1"/>
+          <p:cNvSpPr>
+            <a:spLocks noGrp="1" noRot="1" noChangeAspect="1"/>
+          </p:cNvSpPr>
+          <p:nvPr>
+            <p:ph type="sldImg"/>
+          </p:nvPr>
+        </p:nvSpPr>
+        <p:spPr/>
+      </p:sp>
+      <p:sp>
+        <p:nvSpPr>
+          <p:cNvPr id="3" name="Notes Placeholder 2"/>
+          <p:cNvSpPr>
+            <a:spLocks noGrp="1"/>
+          </p:cNvSpPr>
+          <p:nvPr>
+            <p:ph type="body" idx="1"/>
+          </p:nvPr>
+        </p:nvSpPr>
+        <p:spPr/>
+        <p:txBody>
+          <a:bodyPr/>
+          <a:lstStyle/>
+          <a:p>
+            <a:endParaRPr lang="en-US"/>
+          </a:p>
+        </p:txBody>
+      </p:sp>
+      <p:sp>
+        <p:nvSpPr>
+          <p:cNvPr id="4" name="Slide Number Placeholder 3"/>
+          <p:cNvSpPr>
+            <a:spLocks noGrp="1"/>
+          </p:cNvSpPr>
+          <p:nvPr>
+            <p:ph type="sldNum" sz="quarter" idx="10"/>
+          </p:nvPr>
+        </p:nvSpPr>
+        <p:spPr/>
+        <p:txBody>
+          <a:bodyPr/>
+          <a:lstStyle/>
+          <a:p>
+            <a:pPr>
+              <a:defRPr/>
+            </a:pPr>
+            <a:fld id="{6122490E-C14D-4509-A7F9-FC7223F2C851}" type="slidenum">
+              <a:rPr lang="en-US" smtClean="0"/>
+              <a:pPr>
+                <a:defRPr/>
+              </a:pPr>
+              <a:t>21</a:t>
+            </a:fld>
+            <a:endParaRPr lang="en-US" dirty="0"/>
+          </a:p>
+        </p:txBody>
+      </p:sp>
+    </p:spTree>
+    <p:extLst>
+      <p:ext uri="{BB962C8B-B14F-4D97-AF65-F5344CB8AC3E}">
+        <p14:creationId xmlns:p14="http://schemas.microsoft.com/office/powerpoint/2010/main" val="1211880636"/>
       </p:ext>
     </p:extLst>
   </p:cSld>
@@ -1656,6 +2129,129 @@
         <p:txBody>
           <a:bodyPr/>
           <a:lstStyle/>
+          <a:p>
+            <a:pPr defTabSz="457200" eaLnBrk="1" fontAlgn="auto" hangingPunct="1">
+              <a:spcBef>
+                <a:spcPts val="0"/>
+              </a:spcBef>
+              <a:spcAft>
+                <a:spcPts val="0"/>
+              </a:spcAft>
+              <a:defRPr/>
+            </a:pPr>
+            <a:r>
+              <a:rPr lang="en-US" dirty="0"/>
+              <a:t>The database is a subsystem that is often treated like a “black box”.</a:t>
+            </a:r>
+          </a:p>
+          <a:p>
+            <a:pPr defTabSz="457200" eaLnBrk="1" fontAlgn="auto" hangingPunct="1">
+              <a:spcBef>
+                <a:spcPts val="0"/>
+              </a:spcBef>
+              <a:spcAft>
+                <a:spcPts val="0"/>
+              </a:spcAft>
+              <a:defRPr/>
+            </a:pPr>
+            <a:endParaRPr lang="en-US" dirty="0"/>
+          </a:p>
+          <a:p>
+            <a:pPr defTabSz="457200" eaLnBrk="1" fontAlgn="auto" hangingPunct="1">
+              <a:spcBef>
+                <a:spcPts val="0"/>
+              </a:spcBef>
+              <a:spcAft>
+                <a:spcPts val="0"/>
+              </a:spcAft>
+              <a:defRPr/>
+            </a:pPr>
+            <a:r>
+              <a:rPr lang="en-US" dirty="0"/>
+              <a:t>Development team often own the stored procedures, function, and triggers. They often have logic that satisfies an explicit or implicit requirement.</a:t>
+            </a:r>
+          </a:p>
+          <a:p>
+            <a:pPr defTabSz="457200" eaLnBrk="1" fontAlgn="auto" hangingPunct="1">
+              <a:spcBef>
+                <a:spcPts val="0"/>
+              </a:spcBef>
+              <a:spcAft>
+                <a:spcPts val="0"/>
+              </a:spcAft>
+              <a:defRPr/>
+            </a:pPr>
+            <a:endParaRPr lang="en-US" dirty="0"/>
+          </a:p>
+          <a:p>
+            <a:pPr defTabSz="457200" eaLnBrk="1" fontAlgn="auto" hangingPunct="1">
+              <a:spcBef>
+                <a:spcPts val="0"/>
+              </a:spcBef>
+              <a:spcAft>
+                <a:spcPts val="0"/>
+              </a:spcAft>
+              <a:defRPr/>
+            </a:pPr>
+            <a:r>
+              <a:rPr lang="en-US" dirty="0"/>
+              <a:t>In many organizations, the DBA team owns the table schema.</a:t>
+            </a:r>
+          </a:p>
+          <a:p>
+            <a:pPr defTabSz="457200" eaLnBrk="1" fontAlgn="auto" hangingPunct="1">
+              <a:spcBef>
+                <a:spcPts val="0"/>
+              </a:spcBef>
+              <a:spcAft>
+                <a:spcPts val="0"/>
+              </a:spcAft>
+              <a:defRPr/>
+            </a:pPr>
+            <a:endParaRPr lang="en-US" dirty="0"/>
+          </a:p>
+          <a:p>
+            <a:pPr defTabSz="457200" eaLnBrk="1" fontAlgn="auto" hangingPunct="1">
+              <a:spcBef>
+                <a:spcPts val="0"/>
+              </a:spcBef>
+              <a:spcAft>
+                <a:spcPts val="0"/>
+              </a:spcAft>
+              <a:defRPr/>
+            </a:pPr>
+            <a:r>
+              <a:rPr lang="en-US" dirty="0"/>
+              <a:t>Unit testing databases is difficult because a “unit”, such as a table, is hard to test in isolation. For example, your test code might need to use ADO.NET to query the table. Any number of configuration issues might prevent the test from passing. Besides, this is an integration test.</a:t>
+            </a:r>
+          </a:p>
+          <a:p>
+            <a:pPr defTabSz="457200" eaLnBrk="1" fontAlgn="auto" hangingPunct="1">
+              <a:spcBef>
+                <a:spcPts val="0"/>
+              </a:spcBef>
+              <a:spcAft>
+                <a:spcPts val="0"/>
+              </a:spcAft>
+              <a:defRPr/>
+            </a:pPr>
+            <a:endParaRPr lang="en-US" dirty="0"/>
+          </a:p>
+          <a:p>
+            <a:pPr defTabSz="457200" eaLnBrk="1" fontAlgn="auto" hangingPunct="1">
+              <a:spcBef>
+                <a:spcPts val="0"/>
+              </a:spcBef>
+              <a:spcAft>
+                <a:spcPts val="0"/>
+              </a:spcAft>
+              <a:defRPr/>
+            </a:pPr>
+            <a:r>
+              <a:rPr lang="en-US" dirty="0"/>
+              <a:t>Unit testing stored procedures is difficult because it is difficult to “Arrange” that the data in the tables is mocked so that it is in a known state before the test code executes the SP.</a:t>
+            </a:r>
+          </a:p>
           <a:p>
             <a:pPr marL="0" marR="0" indent="0" algn="l" defTabSz="457200" rtl="0" eaLnBrk="1" fontAlgn="auto" latinLnBrk="0" hangingPunct="1">
               <a:lnSpc>
@@ -2187,7 +2783,24 @@
           <a:bodyPr/>
           <a:lstStyle/>
           <a:p>
-            <a:endParaRPr lang="en-US"/>
+            <a:pPr marL="0" marR="0" indent="0" algn="l" defTabSz="457200" rtl="0" eaLnBrk="1" fontAlgn="auto" latinLnBrk="0" hangingPunct="1">
+              <a:lnSpc>
+                <a:spcPct val="100000"/>
+              </a:lnSpc>
+              <a:spcBef>
+                <a:spcPts val="0"/>
+              </a:spcBef>
+              <a:spcAft>
+                <a:spcPts val="0"/>
+              </a:spcAft>
+              <a:buClrTx/>
+              <a:buSzTx/>
+              <a:buFontTx/>
+              <a:buNone/>
+              <a:tabLst/>
+              <a:defRPr/>
+            </a:pPr>
+            <a:endParaRPr lang="en-US" dirty="0"/>
           </a:p>
         </p:txBody>
       </p:sp>
@@ -2206,24 +2819,27 @@
           <a:bodyPr/>
           <a:lstStyle/>
           <a:p>
-            <a:pPr>
-              <a:defRPr/>
-            </a:pPr>
-            <a:fld id="{6122490E-C14D-4509-A7F9-FC7223F2C851}" type="slidenum">
-              <a:rPr lang="en-US" smtClean="0"/>
-              <a:pPr>
-                <a:defRPr/>
-              </a:pPr>
+            <a:fld id="{A9BD41C3-251C-A347-8A21-AED582F5726E}" type="slidenum">
+              <a:rPr lang="en-US" smtClean="0">
+                <a:solidFill>
+                  <a:prstClr val="black"/>
+                </a:solidFill>
+              </a:rPr>
+              <a:pPr/>
               <a:t>8</a:t>
             </a:fld>
-            <a:endParaRPr lang="en-US" dirty="0"/>
+            <a:endParaRPr lang="en-US">
+              <a:solidFill>
+                <a:prstClr val="black"/>
+              </a:solidFill>
+            </a:endParaRPr>
           </a:p>
         </p:txBody>
       </p:sp>
     </p:spTree>
     <p:extLst>
       <p:ext uri="{BB962C8B-B14F-4D97-AF65-F5344CB8AC3E}">
-        <p14:creationId xmlns:p14="http://schemas.microsoft.com/office/powerpoint/2010/main" val="744993139"/>
+        <p14:creationId xmlns:p14="http://schemas.microsoft.com/office/powerpoint/2010/main" val="1379355316"/>
       </p:ext>
     </p:extLst>
   </p:cSld>
@@ -2277,7 +2893,24 @@
           <a:bodyPr/>
           <a:lstStyle/>
           <a:p>
-            <a:endParaRPr lang="en-US"/>
+            <a:pPr marL="0" marR="0" indent="0" algn="l" defTabSz="457200" rtl="0" eaLnBrk="1" fontAlgn="auto" latinLnBrk="0" hangingPunct="1">
+              <a:lnSpc>
+                <a:spcPct val="100000"/>
+              </a:lnSpc>
+              <a:spcBef>
+                <a:spcPts val="0"/>
+              </a:spcBef>
+              <a:spcAft>
+                <a:spcPts val="0"/>
+              </a:spcAft>
+              <a:buClrTx/>
+              <a:buSzTx/>
+              <a:buFontTx/>
+              <a:buNone/>
+              <a:tabLst/>
+              <a:defRPr/>
+            </a:pPr>
+            <a:endParaRPr lang="en-US" dirty="0"/>
           </a:p>
         </p:txBody>
       </p:sp>
@@ -2296,24 +2929,27 @@
           <a:bodyPr/>
           <a:lstStyle/>
           <a:p>
-            <a:pPr>
-              <a:defRPr/>
-            </a:pPr>
-            <a:fld id="{6122490E-C14D-4509-A7F9-FC7223F2C851}" type="slidenum">
-              <a:rPr lang="en-US" smtClean="0"/>
-              <a:pPr>
-                <a:defRPr/>
-              </a:pPr>
+            <a:fld id="{A9BD41C3-251C-A347-8A21-AED582F5726E}" type="slidenum">
+              <a:rPr lang="en-US" smtClean="0">
+                <a:solidFill>
+                  <a:prstClr val="black"/>
+                </a:solidFill>
+              </a:rPr>
+              <a:pPr/>
               <a:t>9</a:t>
             </a:fld>
-            <a:endParaRPr lang="en-US" dirty="0"/>
+            <a:endParaRPr lang="en-US">
+              <a:solidFill>
+                <a:prstClr val="black"/>
+              </a:solidFill>
+            </a:endParaRPr>
           </a:p>
         </p:txBody>
       </p:sp>
     </p:spTree>
     <p:extLst>
       <p:ext uri="{BB962C8B-B14F-4D97-AF65-F5344CB8AC3E}">
-        <p14:creationId xmlns:p14="http://schemas.microsoft.com/office/powerpoint/2010/main" val="3804378049"/>
+        <p14:creationId xmlns:p14="http://schemas.microsoft.com/office/powerpoint/2010/main" val="1379355316"/>
       </p:ext>
     </p:extLst>
   </p:cSld>
@@ -2412,23 +3048,8 @@
                 </a:solidFill>
                 <a:latin typeface="Tahoma" pitchFamily="34" charset="0"/>
               </a:rPr>
-              <a:t>Automated Unit and Integration Testing with </a:t>
-            </a:r>
-            <a:r>
-              <a:rPr lang="en-US" sz="3500" dirty="0" smtClean="0">
-                <a:solidFill>
-                  <a:srgbClr val="003399"/>
-                </a:solidFill>
-                <a:latin typeface="Tahoma" pitchFamily="34" charset="0"/>
-              </a:rPr>
-              <a:t>Databases</a:t>
-            </a:r>
-            <a:endParaRPr lang="en-US" sz="3500" dirty="0" smtClean="0">
-              <a:solidFill>
-                <a:srgbClr val="003399"/>
-              </a:solidFill>
-              <a:latin typeface="Tahoma" pitchFamily="34" charset="0"/>
-            </a:endParaRPr>
+              <a:t>Automated Unit and Integration Testing with Databases</a:t>
+            </a:r>
           </a:p>
         </p:txBody>
       </p:sp>
@@ -2456,11 +3077,7 @@
           <a:p>
             <a:r>
               <a:rPr lang="en-US" dirty="0" smtClean="0"/>
-              <a:t>Stephen D. </a:t>
-            </a:r>
-            <a:r>
-              <a:rPr lang="en-US" dirty="0" smtClean="0"/>
-              <a:t>Ritchie</a:t>
+              <a:t>Stephen D. Ritchie</a:t>
             </a:r>
           </a:p>
           <a:p>
@@ -2468,7 +3085,6 @@
               <a:rPr lang="en-US" dirty="0" smtClean="0"/>
               <a:t>Philly.NET Code Camp 2012.1</a:t>
             </a:r>
-            <a:endParaRPr lang="en-US" dirty="0" smtClean="0"/>
           </a:p>
           <a:p>
             <a:r>
@@ -3449,6 +4065,370 @@
           <a:p>
             <a:r>
               <a:rPr lang="en-US" dirty="0" smtClean="0"/>
+              <a:t>Tell Me More …</a:t>
+            </a:r>
+            <a:endParaRPr lang="en-US" dirty="0"/>
+          </a:p>
+        </p:txBody>
+      </p:sp>
+      <p:sp>
+        <p:nvSpPr>
+          <p:cNvPr id="3" name="Content Placeholder 2"/>
+          <p:cNvSpPr>
+            <a:spLocks noGrp="1"/>
+          </p:cNvSpPr>
+          <p:nvPr>
+            <p:ph idx="1"/>
+          </p:nvPr>
+        </p:nvSpPr>
+        <p:spPr/>
+        <p:txBody>
+          <a:bodyPr/>
+          <a:lstStyle/>
+          <a:p>
+            <a:r>
+              <a:rPr lang="en-US" dirty="0" smtClean="0"/>
+              <a:t>How does </a:t>
+            </a:r>
+            <a:r>
+              <a:rPr lang="en-US" dirty="0" err="1" smtClean="0"/>
+              <a:t>NDbUnit</a:t>
+            </a:r>
+            <a:r>
+              <a:rPr lang="en-US" dirty="0" smtClean="0"/>
+              <a:t> work?</a:t>
+            </a:r>
+          </a:p>
+          <a:p>
+            <a:endParaRPr lang="en-US" dirty="0"/>
+          </a:p>
+          <a:p>
+            <a:r>
+              <a:rPr lang="en-US" dirty="0" smtClean="0"/>
+              <a:t>Perhaps </a:t>
+            </a:r>
+            <a:r>
+              <a:rPr lang="en-US" dirty="0"/>
+              <a:t>an example would be helpful …</a:t>
+            </a:r>
+          </a:p>
+        </p:txBody>
+      </p:sp>
+    </p:spTree>
+    <p:extLst>
+      <p:ext uri="{BB962C8B-B14F-4D97-AF65-F5344CB8AC3E}">
+        <p14:creationId xmlns:p14="http://schemas.microsoft.com/office/powerpoint/2010/main" val="862202464"/>
+      </p:ext>
+    </p:extLst>
+  </p:cSld>
+  <p:clrMapOvr>
+    <a:masterClrMapping/>
+  </p:clrMapOvr>
+  <p:timing>
+    <p:tnLst>
+      <p:par>
+        <p:cTn id="1" dur="indefinite" restart="never" nodeType="tmRoot"/>
+      </p:par>
+    </p:tnLst>
+  </p:timing>
+</p:sld>
+</file>
+
+<file path=ppt/slides/slide11.xml><?xml version="1.0" encoding="utf-8"?>
+<p:sld xmlns:a="http://schemas.openxmlformats.org/drawingml/2006/main" xmlns:r="http://schemas.openxmlformats.org/officeDocument/2006/relationships" xmlns:p="http://schemas.openxmlformats.org/presentationml/2006/main">
+  <p:cSld>
+    <p:spTree>
+      <p:nvGrpSpPr>
+        <p:cNvPr id="1" name=""/>
+        <p:cNvGrpSpPr/>
+        <p:nvPr/>
+      </p:nvGrpSpPr>
+      <p:grpSpPr>
+        <a:xfrm>
+          <a:off x="0" y="0"/>
+          <a:ext cx="0" cy="0"/>
+          <a:chOff x="0" y="0"/>
+          <a:chExt cx="0" cy="0"/>
+        </a:xfrm>
+      </p:grpSpPr>
+      <p:sp>
+        <p:nvSpPr>
+          <p:cNvPr id="2" name="Title 1"/>
+          <p:cNvSpPr>
+            <a:spLocks noGrp="1"/>
+          </p:cNvSpPr>
+          <p:nvPr>
+            <p:ph type="title"/>
+          </p:nvPr>
+        </p:nvSpPr>
+        <p:spPr/>
+        <p:txBody>
+          <a:bodyPr/>
+          <a:lstStyle/>
+          <a:p>
+            <a:r>
+              <a:rPr lang="en-US" dirty="0"/>
+              <a:t>Unit Testing Databases Is Difficult</a:t>
+            </a:r>
+          </a:p>
+        </p:txBody>
+      </p:sp>
+      <p:sp>
+        <p:nvSpPr>
+          <p:cNvPr id="3" name="Content Placeholder 2"/>
+          <p:cNvSpPr>
+            <a:spLocks noGrp="1"/>
+          </p:cNvSpPr>
+          <p:nvPr>
+            <p:ph idx="1"/>
+          </p:nvPr>
+        </p:nvSpPr>
+        <p:spPr/>
+        <p:txBody>
+          <a:bodyPr/>
+          <a:lstStyle/>
+          <a:p>
+            <a:r>
+              <a:rPr lang="en-US" dirty="0"/>
+              <a:t>Unit Testing Databases Is Difficult</a:t>
+            </a:r>
+          </a:p>
+          <a:p>
+            <a:pPr lvl="1"/>
+            <a:r>
+              <a:rPr lang="en-US" dirty="0"/>
+              <a:t>CRUD Operations on Tables</a:t>
+            </a:r>
+          </a:p>
+          <a:p>
+            <a:pPr lvl="1"/>
+            <a:r>
+              <a:rPr lang="en-US" dirty="0"/>
+              <a:t>Complex Querying of Multiple Tables</a:t>
+            </a:r>
+          </a:p>
+          <a:p>
+            <a:pPr lvl="1"/>
+            <a:r>
+              <a:rPr lang="en-US" dirty="0"/>
+              <a:t>Views</a:t>
+            </a:r>
+          </a:p>
+          <a:p>
+            <a:pPr lvl="1"/>
+            <a:r>
+              <a:rPr lang="en-US" dirty="0"/>
+              <a:t>Functions</a:t>
+            </a:r>
+          </a:p>
+          <a:p>
+            <a:pPr lvl="1"/>
+            <a:r>
+              <a:rPr lang="en-US" dirty="0"/>
+              <a:t>Stored Procedures</a:t>
+            </a:r>
+          </a:p>
+          <a:p>
+            <a:pPr lvl="1"/>
+            <a:r>
+              <a:rPr lang="en-US" dirty="0"/>
+              <a:t>Triggers </a:t>
+            </a:r>
+            <a:r>
+              <a:rPr lang="en-US" dirty="0" smtClean="0"/>
+              <a:t>!?!</a:t>
+            </a:r>
+          </a:p>
+          <a:p>
+            <a:endParaRPr lang="en-US" dirty="0" smtClean="0"/>
+          </a:p>
+          <a:p>
+            <a:r>
+              <a:rPr lang="en-US" dirty="0" smtClean="0"/>
+              <a:t>Perhaps </a:t>
+            </a:r>
+            <a:r>
+              <a:rPr lang="en-US" dirty="0"/>
+              <a:t>an example would be helpful …</a:t>
+            </a:r>
+          </a:p>
+        </p:txBody>
+      </p:sp>
+    </p:spTree>
+    <p:extLst>
+      <p:ext uri="{BB962C8B-B14F-4D97-AF65-F5344CB8AC3E}">
+        <p14:creationId xmlns:p14="http://schemas.microsoft.com/office/powerpoint/2010/main" val="2158681476"/>
+      </p:ext>
+    </p:extLst>
+  </p:cSld>
+  <p:clrMapOvr>
+    <a:masterClrMapping/>
+  </p:clrMapOvr>
+  <p:timing>
+    <p:tnLst>
+      <p:par>
+        <p:cTn id="1" dur="indefinite" restart="never" nodeType="tmRoot"/>
+      </p:par>
+    </p:tnLst>
+  </p:timing>
+</p:sld>
+</file>
+
+<file path=ppt/slides/slide12.xml><?xml version="1.0" encoding="utf-8"?>
+<p:sld xmlns:a="http://schemas.openxmlformats.org/drawingml/2006/main" xmlns:r="http://schemas.openxmlformats.org/officeDocument/2006/relationships" xmlns:p="http://schemas.openxmlformats.org/presentationml/2006/main">
+  <p:cSld>
+    <p:spTree>
+      <p:nvGrpSpPr>
+        <p:cNvPr id="1" name=""/>
+        <p:cNvGrpSpPr/>
+        <p:nvPr/>
+      </p:nvGrpSpPr>
+      <p:grpSpPr>
+        <a:xfrm>
+          <a:off x="0" y="0"/>
+          <a:ext cx="0" cy="0"/>
+          <a:chOff x="0" y="0"/>
+          <a:chExt cx="0" cy="0"/>
+        </a:xfrm>
+      </p:grpSpPr>
+      <p:sp>
+        <p:nvSpPr>
+          <p:cNvPr id="2" name="Title 1"/>
+          <p:cNvSpPr>
+            <a:spLocks noGrp="1"/>
+          </p:cNvSpPr>
+          <p:nvPr>
+            <p:ph type="title"/>
+          </p:nvPr>
+        </p:nvSpPr>
+        <p:spPr/>
+        <p:txBody>
+          <a:bodyPr/>
+          <a:lstStyle/>
+          <a:p>
+            <a:r>
+              <a:rPr lang="en-US" dirty="0"/>
+              <a:t>Automated Integration Testing With Databases Is </a:t>
+            </a:r>
+            <a:r>
+              <a:rPr lang="en-US" i="1" dirty="0"/>
+              <a:t>Really</a:t>
+            </a:r>
+            <a:r>
+              <a:rPr lang="en-US" dirty="0"/>
+              <a:t> Difficult</a:t>
+            </a:r>
+          </a:p>
+        </p:txBody>
+      </p:sp>
+      <p:sp>
+        <p:nvSpPr>
+          <p:cNvPr id="3" name="Content Placeholder 2"/>
+          <p:cNvSpPr>
+            <a:spLocks noGrp="1"/>
+          </p:cNvSpPr>
+          <p:nvPr>
+            <p:ph idx="1"/>
+          </p:nvPr>
+        </p:nvSpPr>
+        <p:spPr/>
+        <p:txBody>
+          <a:bodyPr/>
+          <a:lstStyle/>
+          <a:p>
+            <a:r>
+              <a:rPr lang="en-US" dirty="0" smtClean="0"/>
+              <a:t>Automated </a:t>
+            </a:r>
+            <a:r>
+              <a:rPr lang="en-US" dirty="0"/>
+              <a:t>Integration Testing With Databases Is </a:t>
+            </a:r>
+            <a:r>
+              <a:rPr lang="en-US" i="1" dirty="0"/>
+              <a:t>Really</a:t>
+            </a:r>
+            <a:r>
+              <a:rPr lang="en-US" dirty="0"/>
+              <a:t> Difficult</a:t>
+            </a:r>
+          </a:p>
+          <a:p>
+            <a:pPr lvl="1"/>
+            <a:r>
+              <a:rPr lang="en-US" dirty="0"/>
+              <a:t>“Data Not In Known-State Before Test”</a:t>
+            </a:r>
+          </a:p>
+          <a:p>
+            <a:endParaRPr lang="en-US" dirty="0" smtClean="0"/>
+          </a:p>
+          <a:p>
+            <a:r>
+              <a:rPr lang="en-US" dirty="0" smtClean="0"/>
+              <a:t>Perhaps </a:t>
+            </a:r>
+            <a:r>
+              <a:rPr lang="en-US" dirty="0"/>
+              <a:t>an example would be helpful …</a:t>
+            </a:r>
+          </a:p>
+        </p:txBody>
+      </p:sp>
+    </p:spTree>
+    <p:extLst>
+      <p:ext uri="{BB962C8B-B14F-4D97-AF65-F5344CB8AC3E}">
+        <p14:creationId xmlns:p14="http://schemas.microsoft.com/office/powerpoint/2010/main" val="3925464999"/>
+      </p:ext>
+    </p:extLst>
+  </p:cSld>
+  <p:clrMapOvr>
+    <a:masterClrMapping/>
+  </p:clrMapOvr>
+  <p:timing>
+    <p:tnLst>
+      <p:par>
+        <p:cTn id="1" dur="indefinite" restart="never" nodeType="tmRoot"/>
+      </p:par>
+    </p:tnLst>
+  </p:timing>
+</p:sld>
+</file>
+
+<file path=ppt/slides/slide13.xml><?xml version="1.0" encoding="utf-8"?>
+<p:sld xmlns:a="http://schemas.openxmlformats.org/drawingml/2006/main" xmlns:r="http://schemas.openxmlformats.org/officeDocument/2006/relationships" xmlns:p="http://schemas.openxmlformats.org/presentationml/2006/main">
+  <p:cSld>
+    <p:spTree>
+      <p:nvGrpSpPr>
+        <p:cNvPr id="1" name=""/>
+        <p:cNvGrpSpPr/>
+        <p:nvPr/>
+      </p:nvGrpSpPr>
+      <p:grpSpPr>
+        <a:xfrm>
+          <a:off x="0" y="0"/>
+          <a:ext cx="0" cy="0"/>
+          <a:chOff x="0" y="0"/>
+          <a:chExt cx="0" cy="0"/>
+        </a:xfrm>
+      </p:grpSpPr>
+      <p:sp>
+        <p:nvSpPr>
+          <p:cNvPr id="2" name="Title 1"/>
+          <p:cNvSpPr>
+            <a:spLocks noGrp="1"/>
+          </p:cNvSpPr>
+          <p:nvPr>
+            <p:ph type="title"/>
+          </p:nvPr>
+        </p:nvSpPr>
+        <p:spPr/>
+        <p:txBody>
+          <a:bodyPr/>
+          <a:lstStyle/>
+          <a:p>
+            <a:r>
+              <a:rPr lang="en-US" dirty="0" smtClean="0"/>
               <a:t>Automated Testing The “Surface API”</a:t>
             </a:r>
             <a:endParaRPr lang="en-US" dirty="0"/>
@@ -3551,7 +4531,7 @@
 </p:sld>
 </file>
 
-<file path=ppt/slides/slide11.xml><?xml version="1.0" encoding="utf-8"?>
+<file path=ppt/slides/slide14.xml><?xml version="1.0" encoding="utf-8"?>
 <p:sld xmlns:a="http://schemas.openxmlformats.org/drawingml/2006/main" xmlns:r="http://schemas.openxmlformats.org/officeDocument/2006/relationships" xmlns:p="http://schemas.openxmlformats.org/presentationml/2006/main">
   <p:cSld>
     <p:spTree>
@@ -3695,7 +4675,7 @@
 </p:sld>
 </file>
 
-<file path=ppt/slides/slide12.xml><?xml version="1.0" encoding="utf-8"?>
+<file path=ppt/slides/slide15.xml><?xml version="1.0" encoding="utf-8"?>
 <p:sld xmlns:a="http://schemas.openxmlformats.org/drawingml/2006/main" xmlns:r="http://schemas.openxmlformats.org/officeDocument/2006/relationships" xmlns:p="http://schemas.openxmlformats.org/presentationml/2006/main">
   <p:cSld>
     <p:spTree>
@@ -3837,7 +4817,7 @@
 </p:sld>
 </file>
 
-<file path=ppt/slides/slide13.xml><?xml version="1.0" encoding="utf-8"?>
+<file path=ppt/slides/slide16.xml><?xml version="1.0" encoding="utf-8"?>
 <p:sld xmlns:a="http://schemas.openxmlformats.org/drawingml/2006/main" xmlns:r="http://schemas.openxmlformats.org/officeDocument/2006/relationships" xmlns:p="http://schemas.openxmlformats.org/presentationml/2006/main">
   <p:cSld>
     <p:spTree>
@@ -3998,7 +4978,241 @@
 </p:sld>
 </file>
 
-<file path=ppt/slides/slide14.xml><?xml version="1.0" encoding="utf-8"?>
+<file path=ppt/slides/slide17.xml><?xml version="1.0" encoding="utf-8"?>
+<p:sld xmlns:a="http://schemas.openxmlformats.org/drawingml/2006/main" xmlns:r="http://schemas.openxmlformats.org/officeDocument/2006/relationships" xmlns:p="http://schemas.openxmlformats.org/presentationml/2006/main">
+  <p:cSld>
+    <p:spTree>
+      <p:nvGrpSpPr>
+        <p:cNvPr id="1" name=""/>
+        <p:cNvGrpSpPr/>
+        <p:nvPr/>
+      </p:nvGrpSpPr>
+      <p:grpSpPr>
+        <a:xfrm>
+          <a:off x="0" y="0"/>
+          <a:ext cx="0" cy="0"/>
+          <a:chOff x="0" y="0"/>
+          <a:chExt cx="0" cy="0"/>
+        </a:xfrm>
+      </p:grpSpPr>
+      <p:sp>
+        <p:nvSpPr>
+          <p:cNvPr id="2" name="Title 1"/>
+          <p:cNvSpPr>
+            <a:spLocks noGrp="1"/>
+          </p:cNvSpPr>
+          <p:nvPr>
+            <p:ph type="title"/>
+          </p:nvPr>
+        </p:nvSpPr>
+        <p:spPr/>
+        <p:txBody>
+          <a:bodyPr/>
+          <a:lstStyle/>
+          <a:p>
+            <a:r>
+              <a:rPr lang="en-US" dirty="0" smtClean="0"/>
+              <a:t>Another Option: Microsoft SQL Server</a:t>
+            </a:r>
+            <a:endParaRPr lang="en-US" dirty="0"/>
+          </a:p>
+        </p:txBody>
+      </p:sp>
+      <p:sp>
+        <p:nvSpPr>
+          <p:cNvPr id="3" name="Content Placeholder 2"/>
+          <p:cNvSpPr>
+            <a:spLocks noGrp="1"/>
+          </p:cNvSpPr>
+          <p:nvPr>
+            <p:ph idx="1"/>
+          </p:nvPr>
+        </p:nvSpPr>
+        <p:spPr/>
+        <p:txBody>
+          <a:bodyPr/>
+          <a:lstStyle/>
+          <a:p>
+            <a:r>
+              <a:rPr lang="en-US" dirty="0" err="1" smtClean="0"/>
+              <a:t>tSQLt</a:t>
+            </a:r>
+            <a:endParaRPr lang="en-US" dirty="0" smtClean="0"/>
+          </a:p>
+          <a:p>
+            <a:pPr lvl="1"/>
+            <a:r>
+              <a:rPr lang="en-US" dirty="0"/>
+              <a:t>Database Unit Testing Framework for SQL Server</a:t>
+            </a:r>
+          </a:p>
+          <a:p>
+            <a:pPr lvl="1"/>
+            <a:r>
+              <a:rPr lang="en-US" dirty="0" smtClean="0"/>
+              <a:t>Create &amp; Execute Tests in </a:t>
+            </a:r>
+            <a:br>
+              <a:rPr lang="en-US" dirty="0" smtClean="0"/>
+            </a:br>
+            <a:r>
+              <a:rPr lang="en-US" dirty="0" smtClean="0"/>
+              <a:t>SQL </a:t>
+            </a:r>
+            <a:r>
+              <a:rPr lang="en-US" dirty="0"/>
+              <a:t>Server Management </a:t>
+            </a:r>
+            <a:r>
+              <a:rPr lang="en-US" dirty="0" smtClean="0"/>
+              <a:t>Studio</a:t>
+            </a:r>
+          </a:p>
+          <a:p>
+            <a:pPr lvl="1"/>
+            <a:r>
+              <a:rPr lang="en-US" dirty="0" smtClean="0"/>
+              <a:t>Free, Open Source</a:t>
+            </a:r>
+          </a:p>
+          <a:p>
+            <a:pPr lvl="1"/>
+            <a:r>
+              <a:rPr lang="en-US" dirty="0">
+                <a:hlinkClick r:id="rId2"/>
+              </a:rPr>
+              <a:t>http://tsqlt.org</a:t>
+            </a:r>
+            <a:r>
+              <a:rPr lang="en-US" dirty="0" smtClean="0">
+                <a:hlinkClick r:id="rId2"/>
+              </a:rPr>
+              <a:t>/</a:t>
+            </a:r>
+            <a:r>
+              <a:rPr lang="en-US" dirty="0" smtClean="0"/>
+              <a:t> </a:t>
+            </a:r>
+          </a:p>
+          <a:p>
+            <a:r>
+              <a:rPr lang="en-US" dirty="0" smtClean="0"/>
+              <a:t>Red Gate: SQL Test</a:t>
+            </a:r>
+          </a:p>
+          <a:p>
+            <a:pPr lvl="1"/>
+            <a:r>
+              <a:rPr lang="en-US" dirty="0" smtClean="0"/>
+              <a:t>Unit Test Add-In </a:t>
+            </a:r>
+            <a:r>
+              <a:rPr lang="en-US" dirty="0"/>
+              <a:t>for </a:t>
+            </a:r>
+            <a:r>
+              <a:rPr lang="en-US" dirty="0" smtClean="0"/>
+              <a:t>SSMS</a:t>
+            </a:r>
+          </a:p>
+          <a:p>
+            <a:pPr lvl="1"/>
+            <a:r>
+              <a:rPr lang="en-US" dirty="0" smtClean="0"/>
+              <a:t>Commercial</a:t>
+            </a:r>
+          </a:p>
+          <a:p>
+            <a:pPr lvl="1"/>
+            <a:r>
+              <a:rPr lang="en-US" dirty="0" smtClean="0"/>
+              <a:t>“Powered by </a:t>
+            </a:r>
+            <a:r>
+              <a:rPr lang="en-US" dirty="0" err="1" smtClean="0"/>
+              <a:t>tSQLt</a:t>
+            </a:r>
+            <a:r>
+              <a:rPr lang="en-US" dirty="0" smtClean="0"/>
+              <a:t>” (API)</a:t>
+            </a:r>
+          </a:p>
+          <a:p>
+            <a:pPr lvl="1"/>
+            <a:r>
+              <a:rPr lang="en-US" dirty="0">
+                <a:hlinkClick r:id="rId3"/>
+              </a:rPr>
+              <a:t>http://www.red-gate.com/products/sql-development/sql-test</a:t>
+            </a:r>
+            <a:r>
+              <a:rPr lang="en-US" dirty="0" smtClean="0">
+                <a:hlinkClick r:id="rId3"/>
+              </a:rPr>
+              <a:t>/</a:t>
+            </a:r>
+            <a:endParaRPr lang="en-US" dirty="0" smtClean="0"/>
+          </a:p>
+          <a:p>
+            <a:endParaRPr lang="en-US" dirty="0"/>
+          </a:p>
+        </p:txBody>
+      </p:sp>
+      <p:pic>
+        <p:nvPicPr>
+          <p:cNvPr id="4098" name="Picture 2" descr="http://tsqlt.org/wp-content/uploads/2011/11/tSQLt_Database_Unit_Testing_for_SQL_Server__Logo_210x160.png"/>
+          <p:cNvPicPr>
+            <a:picLocks noChangeAspect="1" noChangeArrowheads="1"/>
+          </p:cNvPicPr>
+          <p:nvPr/>
+        </p:nvPicPr>
+        <p:blipFill>
+          <a:blip r:embed="rId4">
+            <a:extLst>
+              <a:ext uri="{28A0092B-C50C-407E-A947-70E740481C1C}">
+                <a14:useLocalDpi xmlns:a14="http://schemas.microsoft.com/office/drawing/2010/main" val="0"/>
+              </a:ext>
+            </a:extLst>
+          </a:blip>
+          <a:srcRect/>
+          <a:stretch>
+            <a:fillRect/>
+          </a:stretch>
+        </p:blipFill>
+        <p:spPr bwMode="auto">
+          <a:xfrm>
+            <a:off x="5692095" y="2766105"/>
+            <a:ext cx="2000250" cy="1524001"/>
+          </a:xfrm>
+          <a:prstGeom prst="rect">
+            <a:avLst/>
+          </a:prstGeom>
+          <a:noFill/>
+          <a:extLst>
+            <a:ext uri="{909E8E84-426E-40DD-AFC4-6F175D3DCCD1}">
+              <a14:hiddenFill xmlns:a14="http://schemas.microsoft.com/office/drawing/2010/main">
+                <a:solidFill>
+                  <a:srgbClr val="FFFFFF"/>
+                </a:solidFill>
+              </a14:hiddenFill>
+            </a:ext>
+          </a:extLst>
+        </p:spPr>
+      </p:pic>
+    </p:spTree>
+    <p:extLst>
+      <p:ext uri="{BB962C8B-B14F-4D97-AF65-F5344CB8AC3E}">
+        <p14:creationId xmlns:p14="http://schemas.microsoft.com/office/powerpoint/2010/main" val="2797880833"/>
+      </p:ext>
+    </p:extLst>
+  </p:cSld>
+  <p:clrMapOvr>
+    <a:masterClrMapping/>
+  </p:clrMapOvr>
+</p:sld>
+</file>
+
+<file path=ppt/slides/slide18.xml><?xml version="1.0" encoding="utf-8"?>
 <p:sld xmlns:a="http://schemas.openxmlformats.org/drawingml/2006/main" xmlns:r="http://schemas.openxmlformats.org/officeDocument/2006/relationships" xmlns:p="http://schemas.openxmlformats.org/presentationml/2006/main">
   <p:cSld>
     <p:spTree>
@@ -4087,7 +5301,7 @@
 </p:sld>
 </file>
 
-<file path=ppt/slides/slide15.xml><?xml version="1.0" encoding="utf-8"?>
+<file path=ppt/slides/slide19.xml><?xml version="1.0" encoding="utf-8"?>
 <p:sld xmlns:a="http://schemas.openxmlformats.org/drawingml/2006/main" xmlns:r="http://schemas.openxmlformats.org/officeDocument/2006/relationships" xmlns:p="http://schemas.openxmlformats.org/presentationml/2006/main">
   <p:cSld>
     <p:spTree>
@@ -4216,8 +5430,9 @@
             </a:r>
             <a:r>
               <a:rPr lang="en-US" b="1" dirty="0" smtClean="0"/>
-              <a:t>CMAP12</a:t>
-            </a:r>
+              <a:t>PHN3T</a:t>
+            </a:r>
+            <a:endParaRPr lang="en-US" b="1" dirty="0" smtClean="0"/>
           </a:p>
           <a:p>
             <a:pPr marL="342900" indent="-342900">
@@ -4258,142 +5473,6 @@
     <p:extLst>
       <p:ext uri="{BB962C8B-B14F-4D97-AF65-F5344CB8AC3E}">
         <p14:creationId xmlns:p14="http://schemas.microsoft.com/office/powerpoint/2010/main" val="2295688833"/>
-      </p:ext>
-    </p:extLst>
-  </p:cSld>
-  <p:clrMapOvr>
-    <a:masterClrMapping/>
-  </p:clrMapOvr>
-  <p:timing>
-    <p:tnLst>
-      <p:par>
-        <p:cTn id="1" dur="indefinite" restart="never" nodeType="tmRoot"/>
-      </p:par>
-    </p:tnLst>
-  </p:timing>
-</p:sld>
-</file>
-
-<file path=ppt/slides/slide16.xml><?xml version="1.0" encoding="utf-8"?>
-<p:sld xmlns:a="http://schemas.openxmlformats.org/drawingml/2006/main" xmlns:r="http://schemas.openxmlformats.org/officeDocument/2006/relationships" xmlns:p="http://schemas.openxmlformats.org/presentationml/2006/main">
-  <p:cSld>
-    <p:spTree>
-      <p:nvGrpSpPr>
-        <p:cNvPr id="1" name=""/>
-        <p:cNvGrpSpPr/>
-        <p:nvPr/>
-      </p:nvGrpSpPr>
-      <p:grpSpPr>
-        <a:xfrm>
-          <a:off x="0" y="0"/>
-          <a:ext cx="0" cy="0"/>
-          <a:chOff x="0" y="0"/>
-          <a:chExt cx="0" cy="0"/>
-        </a:xfrm>
-      </p:grpSpPr>
-      <p:sp>
-        <p:nvSpPr>
-          <p:cNvPr id="2" name="Title 1"/>
-          <p:cNvSpPr>
-            <a:spLocks noGrp="1"/>
-          </p:cNvSpPr>
-          <p:nvPr>
-            <p:ph type="title"/>
-          </p:nvPr>
-        </p:nvSpPr>
-        <p:spPr/>
-        <p:txBody>
-          <a:bodyPr/>
-          <a:lstStyle/>
-          <a:p>
-            <a:r>
-              <a:rPr lang="en-US" dirty="0" smtClean="0"/>
-              <a:t>More Shameless Self Promotion</a:t>
-            </a:r>
-            <a:endParaRPr lang="en-US" dirty="0"/>
-          </a:p>
-        </p:txBody>
-      </p:sp>
-      <p:sp>
-        <p:nvSpPr>
-          <p:cNvPr id="3" name="Content Placeholder 2"/>
-          <p:cNvSpPr>
-            <a:spLocks noGrp="1"/>
-          </p:cNvSpPr>
-          <p:nvPr>
-            <p:ph idx="1"/>
-          </p:nvPr>
-        </p:nvSpPr>
-        <p:spPr/>
-        <p:txBody>
-          <a:bodyPr/>
-          <a:lstStyle/>
-          <a:p>
-            <a:r>
-              <a:rPr lang="en-US" dirty="0"/>
-              <a:t>Email:	stephen.ritchie@excella.com</a:t>
-            </a:r>
-          </a:p>
-          <a:p>
-            <a:endParaRPr lang="en-US" dirty="0"/>
-          </a:p>
-          <a:p>
-            <a:r>
-              <a:rPr lang="en-US" dirty="0" smtClean="0"/>
-              <a:t>Twitter:	@</a:t>
-            </a:r>
-            <a:r>
-              <a:rPr lang="en-US" dirty="0" err="1" smtClean="0"/>
-              <a:t>ruthlesshelp</a:t>
-            </a:r>
-            <a:endParaRPr lang="en-US" dirty="0" smtClean="0"/>
-          </a:p>
-          <a:p>
-            <a:endParaRPr lang="en-US" dirty="0" smtClean="0"/>
-          </a:p>
-          <a:p>
-            <a:r>
-              <a:rPr lang="en-US" dirty="0" smtClean="0"/>
-              <a:t>Blog:	http://ruthlesslyhelpful.net</a:t>
-            </a:r>
-          </a:p>
-          <a:p>
-            <a:endParaRPr lang="en-US" dirty="0" smtClean="0"/>
-          </a:p>
-          <a:p>
-            <a:r>
-              <a:rPr lang="en-US" dirty="0" smtClean="0"/>
-              <a:t>LinkedIn:</a:t>
-            </a:r>
-            <a:r>
-              <a:rPr lang="en-US" dirty="0"/>
-              <a:t>	http://</a:t>
-            </a:r>
-            <a:r>
-              <a:rPr lang="en-US" dirty="0" smtClean="0"/>
-              <a:t>www.linkedin.com/in/sritchie</a:t>
-            </a:r>
-          </a:p>
-          <a:p>
-            <a:endParaRPr lang="en-US" dirty="0"/>
-          </a:p>
-          <a:p>
-            <a:r>
-              <a:rPr lang="en-US" dirty="0"/>
-              <a:t>Facebook:	http://</a:t>
-            </a:r>
-            <a:r>
-              <a:rPr lang="en-US" dirty="0" smtClean="0"/>
-              <a:t>www.facebook.com/ProDotNetBestPractices</a:t>
-            </a:r>
-            <a:endParaRPr lang="en-US" dirty="0"/>
-          </a:p>
-        </p:txBody>
-      </p:sp>
-    </p:spTree>
-    <p:extLst>
-      <p:ext uri="{BB962C8B-B14F-4D97-AF65-F5344CB8AC3E}">
-        <p14:creationId xmlns:p14="http://schemas.microsoft.com/office/powerpoint/2010/main" val="2993598017"/>
       </p:ext>
     </p:extLst>
   </p:cSld>
@@ -4499,6 +5578,262 @@
 </p:sld>
 </file>
 
+<file path=ppt/slides/slide20.xml><?xml version="1.0" encoding="utf-8"?>
+<p:sld xmlns:a="http://schemas.openxmlformats.org/drawingml/2006/main" xmlns:r="http://schemas.openxmlformats.org/officeDocument/2006/relationships" xmlns:p="http://schemas.openxmlformats.org/presentationml/2006/main">
+  <p:cSld>
+    <p:spTree>
+      <p:nvGrpSpPr>
+        <p:cNvPr id="1" name=""/>
+        <p:cNvGrpSpPr/>
+        <p:nvPr/>
+      </p:nvGrpSpPr>
+      <p:grpSpPr>
+        <a:xfrm>
+          <a:off x="0" y="0"/>
+          <a:ext cx="0" cy="0"/>
+          <a:chOff x="0" y="0"/>
+          <a:chExt cx="0" cy="0"/>
+        </a:xfrm>
+      </p:grpSpPr>
+      <p:sp>
+        <p:nvSpPr>
+          <p:cNvPr id="2" name="Title 1"/>
+          <p:cNvSpPr>
+            <a:spLocks noGrp="1"/>
+          </p:cNvSpPr>
+          <p:nvPr>
+            <p:ph type="title"/>
+          </p:nvPr>
+        </p:nvSpPr>
+        <p:spPr/>
+        <p:txBody>
+          <a:bodyPr/>
+          <a:lstStyle/>
+          <a:p>
+            <a:r>
+              <a:rPr lang="en-US" dirty="0" smtClean="0"/>
+              <a:t>More Shameless Self Promotion</a:t>
+            </a:r>
+            <a:endParaRPr lang="en-US" dirty="0"/>
+          </a:p>
+        </p:txBody>
+      </p:sp>
+      <p:sp>
+        <p:nvSpPr>
+          <p:cNvPr id="3" name="Content Placeholder 2"/>
+          <p:cNvSpPr>
+            <a:spLocks noGrp="1"/>
+          </p:cNvSpPr>
+          <p:nvPr>
+            <p:ph idx="1"/>
+          </p:nvPr>
+        </p:nvSpPr>
+        <p:spPr/>
+        <p:txBody>
+          <a:bodyPr/>
+          <a:lstStyle/>
+          <a:p>
+            <a:r>
+              <a:rPr lang="en-US" dirty="0" smtClean="0"/>
+              <a:t>Code:</a:t>
+            </a:r>
+            <a:r>
+              <a:rPr lang="en-US" dirty="0"/>
+              <a:t>	</a:t>
+            </a:r>
+            <a:r>
+              <a:rPr lang="en-US" dirty="0"/>
+              <a:t>https://github.com/ruthlesshelp</a:t>
+            </a:r>
+            <a:endParaRPr lang="en-US" dirty="0"/>
+          </a:p>
+          <a:p>
+            <a:endParaRPr lang="en-US" dirty="0"/>
+          </a:p>
+          <a:p>
+            <a:r>
+              <a:rPr lang="en-US" dirty="0" smtClean="0"/>
+              <a:t>Slides:</a:t>
+            </a:r>
+            <a:r>
+              <a:rPr lang="en-US" dirty="0" smtClean="0"/>
+              <a:t>	</a:t>
+            </a:r>
+            <a:r>
+              <a:rPr lang="en-US" dirty="0"/>
+              <a:t>http://www.slideshare.net/ruthlesshelp</a:t>
+            </a:r>
+            <a:endParaRPr lang="en-US" dirty="0" smtClean="0"/>
+          </a:p>
+          <a:p>
+            <a:endParaRPr lang="en-US" dirty="0" smtClean="0"/>
+          </a:p>
+        </p:txBody>
+      </p:sp>
+    </p:spTree>
+    <p:extLst>
+      <p:ext uri="{BB962C8B-B14F-4D97-AF65-F5344CB8AC3E}">
+        <p14:creationId xmlns:p14="http://schemas.microsoft.com/office/powerpoint/2010/main" val="2993598017"/>
+      </p:ext>
+    </p:extLst>
+  </p:cSld>
+  <p:clrMapOvr>
+    <a:masterClrMapping/>
+  </p:clrMapOvr>
+  <p:timing>
+    <p:tnLst>
+      <p:par>
+        <p:cTn id="1" dur="indefinite" restart="never" nodeType="tmRoot"/>
+      </p:par>
+    </p:tnLst>
+  </p:timing>
+</p:sld>
+</file>
+
+<file path=ppt/slides/slide21.xml><?xml version="1.0" encoding="utf-8"?>
+<p:sld xmlns:a="http://schemas.openxmlformats.org/drawingml/2006/main" xmlns:r="http://schemas.openxmlformats.org/officeDocument/2006/relationships" xmlns:p="http://schemas.openxmlformats.org/presentationml/2006/main">
+  <p:cSld>
+    <p:spTree>
+      <p:nvGrpSpPr>
+        <p:cNvPr id="1" name=""/>
+        <p:cNvGrpSpPr/>
+        <p:nvPr/>
+      </p:nvGrpSpPr>
+      <p:grpSpPr>
+        <a:xfrm>
+          <a:off x="0" y="0"/>
+          <a:ext cx="0" cy="0"/>
+          <a:chOff x="0" y="0"/>
+          <a:chExt cx="0" cy="0"/>
+        </a:xfrm>
+      </p:grpSpPr>
+      <p:sp>
+        <p:nvSpPr>
+          <p:cNvPr id="2" name="Title 1"/>
+          <p:cNvSpPr>
+            <a:spLocks noGrp="1"/>
+          </p:cNvSpPr>
+          <p:nvPr>
+            <p:ph type="title"/>
+          </p:nvPr>
+        </p:nvSpPr>
+        <p:spPr/>
+        <p:txBody>
+          <a:bodyPr/>
+          <a:lstStyle/>
+          <a:p>
+            <a:r>
+              <a:rPr lang="en-US" dirty="0" smtClean="0"/>
+              <a:t>Even </a:t>
+            </a:r>
+            <a:r>
+              <a:rPr lang="en-US" dirty="0" smtClean="0"/>
+              <a:t>More </a:t>
+            </a:r>
+            <a:r>
+              <a:rPr lang="en-US" dirty="0" smtClean="0"/>
+              <a:t>Shameless Self Promotion</a:t>
+            </a:r>
+            <a:endParaRPr lang="en-US" dirty="0"/>
+          </a:p>
+        </p:txBody>
+      </p:sp>
+      <p:sp>
+        <p:nvSpPr>
+          <p:cNvPr id="3" name="Content Placeholder 2"/>
+          <p:cNvSpPr>
+            <a:spLocks noGrp="1"/>
+          </p:cNvSpPr>
+          <p:nvPr>
+            <p:ph idx="1"/>
+          </p:nvPr>
+        </p:nvSpPr>
+        <p:spPr/>
+        <p:txBody>
+          <a:bodyPr/>
+          <a:lstStyle/>
+          <a:p>
+            <a:r>
+              <a:rPr lang="en-US" dirty="0"/>
+              <a:t>Email:	stephen.ritchie@excella.com</a:t>
+            </a:r>
+          </a:p>
+          <a:p>
+            <a:endParaRPr lang="en-US" dirty="0"/>
+          </a:p>
+          <a:p>
+            <a:r>
+              <a:rPr lang="en-US" dirty="0" smtClean="0"/>
+              <a:t>Twitter:	@</a:t>
+            </a:r>
+            <a:r>
+              <a:rPr lang="en-US" dirty="0" err="1" smtClean="0"/>
+              <a:t>ruthlesshelp</a:t>
+            </a:r>
+            <a:endParaRPr lang="en-US" dirty="0" smtClean="0"/>
+          </a:p>
+          <a:p>
+            <a:endParaRPr lang="en-US" dirty="0" smtClean="0"/>
+          </a:p>
+          <a:p>
+            <a:r>
+              <a:rPr lang="en-US" dirty="0" smtClean="0"/>
+              <a:t>Blog:	http://ruthlesslyhelpful.net</a:t>
+            </a:r>
+          </a:p>
+          <a:p>
+            <a:endParaRPr lang="en-US" dirty="0" smtClean="0"/>
+          </a:p>
+          <a:p>
+            <a:r>
+              <a:rPr lang="en-US" dirty="0" smtClean="0"/>
+              <a:t>LinkedIn:</a:t>
+            </a:r>
+            <a:r>
+              <a:rPr lang="en-US" dirty="0"/>
+              <a:t>	http://</a:t>
+            </a:r>
+            <a:r>
+              <a:rPr lang="en-US" dirty="0" smtClean="0"/>
+              <a:t>www.linkedin.com/in/sritchie</a:t>
+            </a:r>
+          </a:p>
+          <a:p>
+            <a:endParaRPr lang="en-US" dirty="0"/>
+          </a:p>
+          <a:p>
+            <a:r>
+              <a:rPr lang="en-US" dirty="0"/>
+              <a:t>Facebook:	http://</a:t>
+            </a:r>
+            <a:r>
+              <a:rPr lang="en-US" dirty="0" smtClean="0"/>
+              <a:t>www.facebook.com/ProDotNetBestPractices</a:t>
+            </a:r>
+            <a:endParaRPr lang="en-US" dirty="0"/>
+          </a:p>
+        </p:txBody>
+      </p:sp>
+    </p:spTree>
+    <p:extLst>
+      <p:ext uri="{BB962C8B-B14F-4D97-AF65-F5344CB8AC3E}">
+        <p14:creationId xmlns:p14="http://schemas.microsoft.com/office/powerpoint/2010/main" val="1736367851"/>
+      </p:ext>
+    </p:extLst>
+  </p:cSld>
+  <p:clrMapOvr>
+    <a:masterClrMapping/>
+  </p:clrMapOvr>
+  <p:timing>
+    <p:tnLst>
+      <p:par>
+        <p:cTn id="1" dur="indefinite" restart="never" nodeType="tmRoot"/>
+      </p:par>
+    </p:tnLst>
+  </p:timing>
+</p:sld>
+</file>
+
 <file path=ppt/slides/slide3.xml><?xml version="1.0" encoding="utf-8"?>
 <p:sld xmlns:a="http://schemas.openxmlformats.org/drawingml/2006/main" xmlns:r="http://schemas.openxmlformats.org/officeDocument/2006/relationships" xmlns:p="http://schemas.openxmlformats.org/presentationml/2006/main">
   <p:cSld>
@@ -4533,7 +5868,7 @@
           <a:p>
             <a:r>
               <a:rPr lang="en-US" dirty="0" smtClean="0"/>
-              <a:t>Overview</a:t>
+              <a:t>Overview: Database “Units”</a:t>
             </a:r>
             <a:endParaRPr lang="en-US" dirty="0"/>
           </a:p>
@@ -4670,79 +6005,11 @@
           <a:chExt cx="0" cy="0"/>
         </a:xfrm>
       </p:grpSpPr>
-      <p:sp>
-        <p:nvSpPr>
-          <p:cNvPr id="4" name="Title 3"/>
-          <p:cNvSpPr>
-            <a:spLocks noGrp="1"/>
-          </p:cNvSpPr>
-          <p:nvPr>
-            <p:ph type="title"/>
-          </p:nvPr>
-        </p:nvSpPr>
-        <p:spPr/>
-        <p:txBody>
-          <a:bodyPr/>
-          <a:lstStyle/>
-          <a:p>
-            <a:r>
-              <a:rPr lang="en-US" dirty="0" smtClean="0"/>
-              <a:t>Overview</a:t>
-            </a:r>
-            <a:endParaRPr lang="en-US" dirty="0"/>
-          </a:p>
-        </p:txBody>
-      </p:sp>
-      <p:sp>
-        <p:nvSpPr>
-          <p:cNvPr id="5" name="Content Placeholder 4"/>
-          <p:cNvSpPr>
-            <a:spLocks noGrp="1"/>
-          </p:cNvSpPr>
-          <p:nvPr>
-            <p:ph idx="1"/>
-          </p:nvPr>
-        </p:nvSpPr>
-        <p:spPr/>
-        <p:txBody>
-          <a:bodyPr/>
-          <a:lstStyle/>
-          <a:p>
-            <a:r>
-              <a:rPr lang="en-US" dirty="0" smtClean="0"/>
-              <a:t>Automated Integration Testing </a:t>
-            </a:r>
-            <a:r>
-              <a:rPr lang="en-US" dirty="0"/>
-              <a:t>With Databases Is </a:t>
-            </a:r>
-            <a:r>
-              <a:rPr lang="en-US" i="1" dirty="0"/>
-              <a:t>Really</a:t>
-            </a:r>
-            <a:r>
-              <a:rPr lang="en-US" dirty="0"/>
-              <a:t> Difficult</a:t>
-            </a:r>
-          </a:p>
-          <a:p>
-            <a:pPr lvl="1"/>
-            <a:r>
-              <a:rPr lang="en-US" dirty="0"/>
-              <a:t>“Data Not In Known-State Before Test</a:t>
-            </a:r>
-            <a:r>
-              <a:rPr lang="en-US" dirty="0" smtClean="0"/>
-              <a:t>”</a:t>
-            </a:r>
-          </a:p>
-        </p:txBody>
-      </p:sp>
       <p:pic>
         <p:nvPicPr>
-          <p:cNvPr id="2" name="Picture 1"/>
+          <p:cNvPr id="3074" name="Picture 2" descr="http://www.red-gate.com/products/sql-development/sql-developer-bundle/learn-more/assets/images/ContinuousIntegrationCycle.png"/>
           <p:cNvPicPr>
-            <a:picLocks noChangeAspect="1"/>
+            <a:picLocks noChangeAspect="1" noChangeArrowheads="1"/>
           </p:cNvPicPr>
           <p:nvPr/>
         </p:nvPicPr>
@@ -4754,24 +6021,160 @@
               </a:ext>
             </a:extLst>
           </a:blip>
+          <a:srcRect/>
           <a:stretch>
             <a:fillRect/>
           </a:stretch>
         </p:blipFill>
-        <p:spPr>
+        <p:spPr bwMode="auto">
           <a:xfrm>
-            <a:off x="3381828" y="2708728"/>
-            <a:ext cx="2438401" cy="2438401"/>
+            <a:off x="4688114" y="1534738"/>
+            <a:ext cx="4455886" cy="3210543"/>
           </a:xfrm>
           <a:prstGeom prst="rect">
             <a:avLst/>
           </a:prstGeom>
+          <a:noFill/>
+          <a:extLst>
+            <a:ext uri="{909E8E84-426E-40DD-AFC4-6F175D3DCCD1}">
+              <a14:hiddenFill xmlns:a14="http://schemas.microsoft.com/office/drawing/2010/main">
+                <a:solidFill>
+                  <a:srgbClr val="FFFFFF"/>
+                </a:solidFill>
+              </a14:hiddenFill>
+            </a:ext>
+          </a:extLst>
         </p:spPr>
       </p:pic>
+      <p:sp>
+        <p:nvSpPr>
+          <p:cNvPr id="4" name="Title 3"/>
+          <p:cNvSpPr>
+            <a:spLocks noGrp="1"/>
+          </p:cNvSpPr>
+          <p:nvPr>
+            <p:ph type="title"/>
+          </p:nvPr>
+        </p:nvSpPr>
+        <p:spPr/>
+        <p:txBody>
+          <a:bodyPr/>
+          <a:lstStyle/>
+          <a:p>
+            <a:r>
+              <a:rPr lang="en-US" dirty="0" smtClean="0"/>
+              <a:t>Overview: Automated Testing Requirements</a:t>
+            </a:r>
+            <a:endParaRPr lang="en-US" dirty="0"/>
+          </a:p>
+        </p:txBody>
+      </p:sp>
+      <p:sp>
+        <p:nvSpPr>
+          <p:cNvPr id="5" name="Content Placeholder 4"/>
+          <p:cNvSpPr>
+            <a:spLocks noGrp="1"/>
+          </p:cNvSpPr>
+          <p:nvPr>
+            <p:ph idx="1"/>
+          </p:nvPr>
+        </p:nvSpPr>
+        <p:spPr/>
+        <p:txBody>
+          <a:bodyPr/>
+          <a:lstStyle/>
+          <a:p>
+            <a:r>
+              <a:rPr lang="en-US" dirty="0" smtClean="0"/>
+              <a:t>Run Everywhere</a:t>
+            </a:r>
+          </a:p>
+          <a:p>
+            <a:pPr lvl="1"/>
+            <a:r>
+              <a:rPr lang="en-US" dirty="0" smtClean="0"/>
+              <a:t>Every developer must be able to run </a:t>
+            </a:r>
+            <a:br>
+              <a:rPr lang="en-US" dirty="0" smtClean="0"/>
+            </a:br>
+            <a:r>
+              <a:rPr lang="en-US" dirty="0" smtClean="0"/>
+              <a:t>the combined collection of all the </a:t>
+            </a:r>
+            <a:br>
+              <a:rPr lang="en-US" dirty="0" smtClean="0"/>
+            </a:br>
+            <a:r>
+              <a:rPr lang="en-US" dirty="0" smtClean="0"/>
+              <a:t>other developers’ tests.</a:t>
+            </a:r>
+          </a:p>
+          <a:p>
+            <a:pPr lvl="1"/>
+            <a:endParaRPr lang="en-US" dirty="0"/>
+          </a:p>
+          <a:p>
+            <a:r>
+              <a:rPr lang="en-US" dirty="0" smtClean="0"/>
+              <a:t>Continuous Integration</a:t>
+            </a:r>
+            <a:endParaRPr lang="en-US" dirty="0"/>
+          </a:p>
+          <a:p>
+            <a:pPr lvl="1"/>
+            <a:r>
+              <a:rPr lang="en-US" dirty="0" smtClean="0"/>
+              <a:t>The CI server must be able to run </a:t>
+            </a:r>
+            <a:br>
+              <a:rPr lang="en-US" dirty="0" smtClean="0"/>
+            </a:br>
+            <a:r>
+              <a:rPr lang="en-US" dirty="0" smtClean="0"/>
+              <a:t>the entire suite of tests withou</a:t>
+            </a:r>
+            <a:r>
+              <a:rPr lang="en-US" dirty="0" smtClean="0"/>
+              <a:t>t </a:t>
+            </a:r>
+            <a:br>
+              <a:rPr lang="en-US" dirty="0" smtClean="0"/>
+            </a:br>
+            <a:r>
+              <a:rPr lang="en-US" dirty="0" smtClean="0"/>
+              <a:t>manual intervention.</a:t>
+            </a:r>
+            <a:endParaRPr lang="en-US" dirty="0" smtClean="0"/>
+          </a:p>
+          <a:p>
+            <a:pPr lvl="1"/>
+            <a:endParaRPr lang="en-US" dirty="0" smtClean="0"/>
+          </a:p>
+          <a:p>
+            <a:r>
+              <a:rPr lang="en-US" dirty="0" smtClean="0"/>
+              <a:t>Deterministic, Isolated and Repeatable</a:t>
+            </a:r>
+          </a:p>
+          <a:p>
+            <a:pPr lvl="1"/>
+            <a:r>
+              <a:rPr lang="en-US" dirty="0" smtClean="0"/>
+              <a:t>The outcome of the tests must be unambiguous</a:t>
+            </a:r>
+            <a:r>
+              <a:rPr lang="en-US" dirty="0" smtClean="0"/>
+              <a:t> and repeatable. Usually, the standard is that if one test fails the entire test run fails.</a:t>
+            </a:r>
+            <a:endParaRPr lang="en-US" dirty="0" smtClean="0"/>
+          </a:p>
+        </p:txBody>
+      </p:sp>
     </p:spTree>
     <p:extLst>
       <p:ext uri="{BB962C8B-B14F-4D97-AF65-F5344CB8AC3E}">
-        <p14:creationId xmlns:p14="http://schemas.microsoft.com/office/powerpoint/2010/main" val="53802294"/>
+        <p14:creationId xmlns:p14="http://schemas.microsoft.com/office/powerpoint/2010/main" val="2168180451"/>
       </p:ext>
     </p:extLst>
   </p:cSld>
@@ -4805,6 +6208,70 @@
           <a:chExt cx="0" cy="0"/>
         </a:xfrm>
       </p:grpSpPr>
+      <p:pic>
+        <p:nvPicPr>
+          <p:cNvPr id="1026" name="Picture 2"/>
+          <p:cNvPicPr>
+            <a:picLocks noChangeAspect="1" noChangeArrowheads="1"/>
+          </p:cNvPicPr>
+          <p:nvPr/>
+        </p:nvPicPr>
+        <p:blipFill>
+          <a:blip r:embed="rId3">
+            <a:extLst>
+              <a:ext uri="{28A0092B-C50C-407E-A947-70E740481C1C}">
+                <a14:useLocalDpi xmlns:a14="http://schemas.microsoft.com/office/drawing/2010/main" val="0"/>
+              </a:ext>
+            </a:extLst>
+          </a:blip>
+          <a:srcRect/>
+          <a:stretch>
+            <a:fillRect/>
+          </a:stretch>
+        </p:blipFill>
+        <p:spPr bwMode="auto">
+          <a:xfrm>
+            <a:off x="4992914" y="2104799"/>
+            <a:ext cx="3818164" cy="3818164"/>
+          </a:xfrm>
+          <a:prstGeom prst="rect">
+            <a:avLst/>
+          </a:prstGeom>
+          <a:noFill/>
+          <a:ln>
+            <a:noFill/>
+          </a:ln>
+          <a:effectLst/>
+          <a:extLst>
+            <a:ext uri="{909E8E84-426E-40DD-AFC4-6F175D3DCCD1}">
+              <a14:hiddenFill xmlns:a14="http://schemas.microsoft.com/office/drawing/2010/main">
+                <a:solidFill>
+                  <a:schemeClr val="accent1"/>
+                </a:solidFill>
+              </a14:hiddenFill>
+            </a:ext>
+            <a:ext uri="{91240B29-F687-4F45-9708-019B960494DF}">
+              <a14:hiddenLine xmlns:a14="http://schemas.microsoft.com/office/drawing/2010/main" w="9525">
+                <a:solidFill>
+                  <a:schemeClr val="tx1"/>
+                </a:solidFill>
+                <a:miter lim="800000"/>
+                <a:headEnd/>
+                <a:tailEnd/>
+              </a14:hiddenLine>
+            </a:ext>
+            <a:ext uri="{AF507438-7753-43E0-B8FC-AC1667EBCBE1}">
+              <a14:hiddenEffects xmlns:a14="http://schemas.microsoft.com/office/drawing/2010/main">
+                <a:effectLst>
+                  <a:outerShdw dist="35921" dir="2700000" algn="ctr" rotWithShape="0">
+                    <a:schemeClr val="bg2"/>
+                  </a:outerShdw>
+                </a:effectLst>
+              </a14:hiddenEffects>
+            </a:ext>
+          </a:extLst>
+        </p:spPr>
+      </p:pic>
       <p:sp>
         <p:nvSpPr>
           <p:cNvPr id="4" name="Title 3"/>
@@ -4822,7 +6289,518 @@
           <a:p>
             <a:r>
               <a:rPr lang="en-US" dirty="0" smtClean="0"/>
-              <a:t>Overview</a:t>
+              <a:t>Overview: Databases Present Hurdles</a:t>
+            </a:r>
+            <a:endParaRPr lang="en-US" dirty="0"/>
+          </a:p>
+        </p:txBody>
+      </p:sp>
+      <p:sp>
+        <p:nvSpPr>
+          <p:cNvPr id="5" name="Content Placeholder 4"/>
+          <p:cNvSpPr>
+            <a:spLocks noGrp="1"/>
+          </p:cNvSpPr>
+          <p:nvPr>
+            <p:ph idx="1"/>
+          </p:nvPr>
+        </p:nvSpPr>
+        <p:spPr/>
+        <p:txBody>
+          <a:bodyPr/>
+          <a:lstStyle/>
+          <a:p>
+            <a:r>
+              <a:rPr lang="en-US" dirty="0" smtClean="0"/>
+              <a:t>Automated Integration Testing </a:t>
+            </a:r>
+            <a:r>
+              <a:rPr lang="en-US" dirty="0" smtClean="0"/>
+              <a:t>with Databases</a:t>
+            </a:r>
+          </a:p>
+          <a:p>
+            <a:endParaRPr lang="en-US" dirty="0"/>
+          </a:p>
+          <a:p>
+            <a:r>
+              <a:rPr lang="en-US" dirty="0" smtClean="0"/>
+              <a:t>This is </a:t>
+            </a:r>
+            <a:r>
+              <a:rPr lang="en-US" i="1" dirty="0"/>
+              <a:t>Really</a:t>
+            </a:r>
+            <a:r>
+              <a:rPr lang="en-US" dirty="0"/>
+              <a:t> Difficult</a:t>
+            </a:r>
+          </a:p>
+          <a:p>
+            <a:endParaRPr lang="en-US" dirty="0" smtClean="0"/>
+          </a:p>
+          <a:p>
+            <a:pPr lvl="1"/>
+            <a:r>
+              <a:rPr lang="en-US" dirty="0" smtClean="0"/>
+              <a:t>Schema Not Migrated/Versioned</a:t>
+            </a:r>
+          </a:p>
+          <a:p>
+            <a:endParaRPr lang="en-US" dirty="0" smtClean="0"/>
+          </a:p>
+          <a:p>
+            <a:pPr lvl="1"/>
+            <a:r>
+              <a:rPr lang="en-US" dirty="0" smtClean="0"/>
+              <a:t>Data </a:t>
+            </a:r>
+            <a:r>
+              <a:rPr lang="en-US" dirty="0"/>
+              <a:t>Not In </a:t>
+            </a:r>
+            <a:r>
+              <a:rPr lang="en-US" dirty="0" smtClean="0"/>
+              <a:t>“Known-State”</a:t>
+            </a:r>
+          </a:p>
+          <a:p>
+            <a:pPr lvl="1"/>
+            <a:endParaRPr lang="en-US" dirty="0" smtClean="0"/>
+          </a:p>
+          <a:p>
+            <a:pPr lvl="1"/>
+            <a:r>
+              <a:rPr lang="en-US" dirty="0" smtClean="0"/>
+              <a:t>Concurrency Control</a:t>
+            </a:r>
+            <a:endParaRPr lang="en-US" dirty="0" smtClean="0"/>
+          </a:p>
+        </p:txBody>
+      </p:sp>
+    </p:spTree>
+    <p:extLst>
+      <p:ext uri="{BB962C8B-B14F-4D97-AF65-F5344CB8AC3E}">
+        <p14:creationId xmlns:p14="http://schemas.microsoft.com/office/powerpoint/2010/main" val="53802294"/>
+      </p:ext>
+    </p:extLst>
+  </p:cSld>
+  <p:clrMapOvr>
+    <a:masterClrMapping/>
+  </p:clrMapOvr>
+  <p:timing>
+    <p:tnLst>
+      <p:par>
+        <p:cTn id="1" dur="indefinite" restart="never" nodeType="tmRoot"/>
+      </p:par>
+    </p:tnLst>
+  </p:timing>
+</p:sld>
+</file>
+
+<file path=ppt/slides/slide6.xml><?xml version="1.0" encoding="utf-8"?>
+<p:sld xmlns:a="http://schemas.openxmlformats.org/drawingml/2006/main" xmlns:r="http://schemas.openxmlformats.org/officeDocument/2006/relationships" xmlns:p="http://schemas.openxmlformats.org/presentationml/2006/main">
+  <p:cSld>
+    <p:spTree>
+      <p:nvGrpSpPr>
+        <p:cNvPr id="1" name=""/>
+        <p:cNvGrpSpPr/>
+        <p:nvPr/>
+      </p:nvGrpSpPr>
+      <p:grpSpPr>
+        <a:xfrm>
+          <a:off x="0" y="0"/>
+          <a:ext cx="0" cy="0"/>
+          <a:chOff x="0" y="0"/>
+          <a:chExt cx="0" cy="0"/>
+        </a:xfrm>
+      </p:grpSpPr>
+      <p:sp>
+        <p:nvSpPr>
+          <p:cNvPr id="4" name="Title 3"/>
+          <p:cNvSpPr>
+            <a:spLocks noGrp="1"/>
+          </p:cNvSpPr>
+          <p:nvPr>
+            <p:ph type="title"/>
+          </p:nvPr>
+        </p:nvSpPr>
+        <p:spPr/>
+        <p:txBody>
+          <a:bodyPr/>
+          <a:lstStyle/>
+          <a:p>
+            <a:r>
+              <a:rPr lang="en-US" dirty="0" err="1" smtClean="0"/>
+              <a:t>RoundhousE</a:t>
+            </a:r>
+            <a:endParaRPr lang="en-US" dirty="0"/>
+          </a:p>
+        </p:txBody>
+      </p:sp>
+      <p:pic>
+        <p:nvPicPr>
+          <p:cNvPr id="2050" name="Picture 2"/>
+          <p:cNvPicPr>
+            <a:picLocks noChangeAspect="1" noChangeArrowheads="1"/>
+          </p:cNvPicPr>
+          <p:nvPr/>
+        </p:nvPicPr>
+        <p:blipFill>
+          <a:blip r:embed="rId3">
+            <a:extLst>
+              <a:ext uri="{28A0092B-C50C-407E-A947-70E740481C1C}">
+                <a14:useLocalDpi xmlns:a14="http://schemas.microsoft.com/office/drawing/2010/main" val="0"/>
+              </a:ext>
+            </a:extLst>
+          </a:blip>
+          <a:srcRect/>
+          <a:stretch>
+            <a:fillRect/>
+          </a:stretch>
+        </p:blipFill>
+        <p:spPr bwMode="auto">
+          <a:xfrm>
+            <a:off x="6322329" y="2195285"/>
+            <a:ext cx="2676525" cy="2528888"/>
+          </a:xfrm>
+          <a:prstGeom prst="rect">
+            <a:avLst/>
+          </a:prstGeom>
+          <a:gradFill>
+            <a:gsLst>
+              <a:gs pos="0">
+                <a:schemeClr val="accent1">
+                  <a:shade val="30000"/>
+                  <a:satMod val="115000"/>
+                </a:schemeClr>
+              </a:gs>
+              <a:gs pos="50000">
+                <a:schemeClr val="accent1">
+                  <a:shade val="67500"/>
+                  <a:satMod val="115000"/>
+                </a:schemeClr>
+              </a:gs>
+              <a:gs pos="100000">
+                <a:schemeClr val="accent1">
+                  <a:shade val="100000"/>
+                  <a:satMod val="115000"/>
+                </a:schemeClr>
+              </a:gs>
+            </a:gsLst>
+            <a:lin ang="5400000" scaled="0"/>
+          </a:gradFill>
+          <a:ln>
+            <a:noFill/>
+          </a:ln>
+          <a:effectLst/>
+        </p:spPr>
+      </p:pic>
+      <p:sp>
+        <p:nvSpPr>
+          <p:cNvPr id="5" name="Content Placeholder 4"/>
+          <p:cNvSpPr>
+            <a:spLocks noGrp="1"/>
+          </p:cNvSpPr>
+          <p:nvPr>
+            <p:ph idx="1"/>
+          </p:nvPr>
+        </p:nvSpPr>
+        <p:spPr/>
+        <p:txBody>
+          <a:bodyPr/>
+          <a:lstStyle/>
+          <a:p>
+            <a:r>
+              <a:rPr lang="en-US" dirty="0" smtClean="0"/>
+              <a:t>Database Versioning and Change Management</a:t>
+            </a:r>
+            <a:endParaRPr lang="en-US" dirty="0" smtClean="0"/>
+          </a:p>
+          <a:p>
+            <a:pPr lvl="1"/>
+            <a:r>
+              <a:rPr lang="en-US" dirty="0" smtClean="0"/>
+              <a:t>Migrations Engine</a:t>
+            </a:r>
+            <a:endParaRPr lang="en-US" dirty="0" smtClean="0"/>
+          </a:p>
+          <a:p>
+            <a:pPr lvl="1"/>
+            <a:r>
+              <a:rPr lang="en-US" dirty="0" smtClean="0"/>
+              <a:t>Convention Over Configuration</a:t>
+            </a:r>
+            <a:endParaRPr lang="en-US" dirty="0" smtClean="0"/>
+          </a:p>
+          <a:p>
+            <a:r>
+              <a:rPr lang="en-US" dirty="0"/>
+              <a:t>Apache License, Version </a:t>
+            </a:r>
+            <a:r>
+              <a:rPr lang="en-US" dirty="0" smtClean="0"/>
+              <a:t>2.0</a:t>
+            </a:r>
+          </a:p>
+          <a:p>
+            <a:pPr lvl="1"/>
+            <a:r>
+              <a:rPr lang="en-US" dirty="0" smtClean="0"/>
+              <a:t>Free and Open Source</a:t>
+            </a:r>
+          </a:p>
+          <a:p>
+            <a:r>
+              <a:rPr lang="en-US" dirty="0" err="1" smtClean="0"/>
+              <a:t>NDbUnit</a:t>
+            </a:r>
+            <a:r>
+              <a:rPr lang="en-US" dirty="0" smtClean="0"/>
+              <a:t> Project</a:t>
+            </a:r>
+          </a:p>
+          <a:p>
+            <a:pPr lvl="1"/>
+            <a:r>
+              <a:rPr lang="en-US" dirty="0">
+                <a:hlinkClick r:id="rId4"/>
+              </a:rPr>
+              <a:t>http://code.google.com/p/roundhouse</a:t>
+            </a:r>
+            <a:r>
+              <a:rPr lang="en-US" dirty="0" smtClean="0">
+                <a:hlinkClick r:id="rId4"/>
+              </a:rPr>
+              <a:t>/</a:t>
+            </a:r>
+            <a:r>
+              <a:rPr lang="en-US" dirty="0" smtClean="0"/>
+              <a:t> </a:t>
+            </a:r>
+            <a:endParaRPr lang="en-US" dirty="0" smtClean="0"/>
+          </a:p>
+          <a:p>
+            <a:r>
+              <a:rPr lang="en-US" dirty="0" err="1" smtClean="0"/>
+              <a:t>NuGet</a:t>
+            </a:r>
+            <a:r>
+              <a:rPr lang="en-US" dirty="0" smtClean="0"/>
+              <a:t> Package</a:t>
+            </a:r>
+          </a:p>
+          <a:p>
+            <a:pPr lvl="1"/>
+            <a:r>
+              <a:rPr lang="en-US" dirty="0">
+                <a:hlinkClick r:id="rId5"/>
+              </a:rPr>
+              <a:t>http://</a:t>
+            </a:r>
+            <a:r>
+              <a:rPr lang="en-US" dirty="0" smtClean="0">
+                <a:hlinkClick r:id="rId5"/>
+              </a:rPr>
+              <a:t>nuget.org/packages/roundhouse</a:t>
+            </a:r>
+            <a:r>
+              <a:rPr lang="en-US" dirty="0" smtClean="0"/>
+              <a:t>  </a:t>
+            </a:r>
+            <a:endParaRPr lang="en-US" dirty="0" smtClean="0"/>
+          </a:p>
+          <a:p>
+            <a:r>
+              <a:rPr lang="en-US" dirty="0" smtClean="0"/>
+              <a:t>Documentation</a:t>
+            </a:r>
+            <a:endParaRPr lang="en-US" dirty="0" smtClean="0"/>
+          </a:p>
+          <a:p>
+            <a:pPr lvl="1"/>
+            <a:r>
+              <a:rPr lang="en-US" dirty="0">
+                <a:hlinkClick r:id="rId6"/>
+              </a:rPr>
+              <a:t>https://</a:t>
+            </a:r>
+            <a:r>
+              <a:rPr lang="en-US" dirty="0" smtClean="0">
+                <a:hlinkClick r:id="rId6"/>
+              </a:rPr>
+              <a:t>github.com/chucknorris/roundhouse/wiki</a:t>
+            </a:r>
+            <a:r>
+              <a:rPr lang="en-US" dirty="0" smtClean="0"/>
+              <a:t> </a:t>
+            </a:r>
+            <a:endParaRPr lang="en-US" dirty="0" smtClean="0"/>
+          </a:p>
+        </p:txBody>
+      </p:sp>
+    </p:spTree>
+    <p:extLst>
+      <p:ext uri="{BB962C8B-B14F-4D97-AF65-F5344CB8AC3E}">
+        <p14:creationId xmlns:p14="http://schemas.microsoft.com/office/powerpoint/2010/main" val="53802294"/>
+      </p:ext>
+    </p:extLst>
+  </p:cSld>
+  <p:clrMapOvr>
+    <a:masterClrMapping/>
+  </p:clrMapOvr>
+  <p:timing>
+    <p:tnLst>
+      <p:par>
+        <p:cTn id="1" dur="indefinite" restart="never" nodeType="tmRoot"/>
+      </p:par>
+    </p:tnLst>
+  </p:timing>
+</p:sld>
+</file>
+
+<file path=ppt/slides/slide7.xml><?xml version="1.0" encoding="utf-8"?>
+<p:sld xmlns:a="http://schemas.openxmlformats.org/drawingml/2006/main" xmlns:r="http://schemas.openxmlformats.org/officeDocument/2006/relationships" xmlns:p="http://schemas.openxmlformats.org/presentationml/2006/main">
+  <p:cSld>
+    <p:spTree>
+      <p:nvGrpSpPr>
+        <p:cNvPr id="1" name=""/>
+        <p:cNvGrpSpPr/>
+        <p:nvPr/>
+      </p:nvGrpSpPr>
+      <p:grpSpPr>
+        <a:xfrm>
+          <a:off x="0" y="0"/>
+          <a:ext cx="0" cy="0"/>
+          <a:chOff x="0" y="0"/>
+          <a:chExt cx="0" cy="0"/>
+        </a:xfrm>
+      </p:grpSpPr>
+      <p:sp>
+        <p:nvSpPr>
+          <p:cNvPr id="2" name="Title 1"/>
+          <p:cNvSpPr>
+            <a:spLocks noGrp="1"/>
+          </p:cNvSpPr>
+          <p:nvPr>
+            <p:ph type="title"/>
+          </p:nvPr>
+        </p:nvSpPr>
+        <p:spPr/>
+        <p:txBody>
+          <a:bodyPr/>
+          <a:lstStyle/>
+          <a:p>
+            <a:r>
+              <a:rPr lang="en-US" dirty="0" smtClean="0"/>
+              <a:t>Tell Me More …</a:t>
+            </a:r>
+            <a:endParaRPr lang="en-US" dirty="0"/>
+          </a:p>
+        </p:txBody>
+      </p:sp>
+      <p:sp>
+        <p:nvSpPr>
+          <p:cNvPr id="3" name="Content Placeholder 2"/>
+          <p:cNvSpPr>
+            <a:spLocks noGrp="1"/>
+          </p:cNvSpPr>
+          <p:nvPr>
+            <p:ph idx="1"/>
+          </p:nvPr>
+        </p:nvSpPr>
+        <p:spPr/>
+        <p:txBody>
+          <a:bodyPr/>
+          <a:lstStyle/>
+          <a:p>
+            <a:r>
+              <a:rPr lang="en-US" dirty="0" smtClean="0"/>
+              <a:t>How does </a:t>
+            </a:r>
+            <a:r>
+              <a:rPr lang="en-US" dirty="0" err="1" smtClean="0"/>
+              <a:t>RoundhousE</a:t>
+            </a:r>
+            <a:r>
+              <a:rPr lang="en-US" dirty="0" smtClean="0"/>
+              <a:t> </a:t>
+            </a:r>
+            <a:r>
+              <a:rPr lang="en-US" dirty="0" smtClean="0"/>
+              <a:t>work?</a:t>
+            </a:r>
+          </a:p>
+          <a:p>
+            <a:endParaRPr lang="en-US" dirty="0"/>
+          </a:p>
+          <a:p>
+            <a:r>
+              <a:rPr lang="en-US" dirty="0" smtClean="0"/>
+              <a:t>Perhaps </a:t>
+            </a:r>
+            <a:r>
+              <a:rPr lang="en-US" dirty="0"/>
+              <a:t>an example would be helpful …</a:t>
+            </a:r>
+          </a:p>
+        </p:txBody>
+      </p:sp>
+    </p:spTree>
+    <p:extLst>
+      <p:ext uri="{BB962C8B-B14F-4D97-AF65-F5344CB8AC3E}">
+        <p14:creationId xmlns:p14="http://schemas.microsoft.com/office/powerpoint/2010/main" val="2313767250"/>
+      </p:ext>
+    </p:extLst>
+  </p:cSld>
+  <p:clrMapOvr>
+    <a:masterClrMapping/>
+  </p:clrMapOvr>
+  <p:timing>
+    <p:tnLst>
+      <p:par>
+        <p:cTn id="1" dur="indefinite" restart="never" nodeType="tmRoot"/>
+      </p:par>
+    </p:tnLst>
+  </p:timing>
+</p:sld>
+</file>
+
+<file path=ppt/slides/slide8.xml><?xml version="1.0" encoding="utf-8"?>
+<p:sld xmlns:a="http://schemas.openxmlformats.org/drawingml/2006/main" xmlns:r="http://schemas.openxmlformats.org/officeDocument/2006/relationships" xmlns:p="http://schemas.openxmlformats.org/presentationml/2006/main">
+  <p:cSld>
+    <p:spTree>
+      <p:nvGrpSpPr>
+        <p:cNvPr id="1" name=""/>
+        <p:cNvGrpSpPr/>
+        <p:nvPr/>
+      </p:nvGrpSpPr>
+      <p:grpSpPr>
+        <a:xfrm>
+          <a:off x="0" y="0"/>
+          <a:ext cx="0" cy="0"/>
+          <a:chOff x="0" y="0"/>
+          <a:chExt cx="0" cy="0"/>
+        </a:xfrm>
+      </p:grpSpPr>
+      <p:sp>
+        <p:nvSpPr>
+          <p:cNvPr id="4" name="Title 3"/>
+          <p:cNvSpPr>
+            <a:spLocks noGrp="1"/>
+          </p:cNvSpPr>
+          <p:nvPr>
+            <p:ph type="title"/>
+          </p:nvPr>
+        </p:nvSpPr>
+        <p:spPr/>
+        <p:txBody>
+          <a:bodyPr/>
+          <a:lstStyle/>
+          <a:p>
+            <a:r>
+              <a:rPr lang="en-US" dirty="0" smtClean="0"/>
+              <a:t>Motivation</a:t>
             </a:r>
             <a:endParaRPr lang="en-US" dirty="0"/>
           </a:p>
@@ -4936,7 +6914,7 @@
 </p:sld>
 </file>
 
-<file path=ppt/slides/slide6.xml><?xml version="1.0" encoding="utf-8"?>
+<file path=ppt/slides/slide9.xml><?xml version="1.0" encoding="utf-8"?>
 <p:sld xmlns:a="http://schemas.openxmlformats.org/drawingml/2006/main" xmlns:r="http://schemas.openxmlformats.org/officeDocument/2006/relationships" xmlns:p="http://schemas.openxmlformats.org/presentationml/2006/main">
   <p:cSld>
     <p:spTree>
@@ -4969,8 +6947,8 @@
           <a:lstStyle/>
           <a:p>
             <a:r>
-              <a:rPr lang="en-US" dirty="0" smtClean="0"/>
-              <a:t>Overview</a:t>
+              <a:rPr lang="en-US" dirty="0" err="1" smtClean="0"/>
+              <a:t>NDbUnit</a:t>
             </a:r>
             <a:endParaRPr lang="en-US" dirty="0"/>
           </a:p>
@@ -4992,91 +6970,95 @@
           <a:lstStyle/>
           <a:p>
             <a:r>
+              <a:rPr lang="en-US" dirty="0" smtClean="0"/>
+              <a:t>Database </a:t>
+            </a:r>
+            <a:r>
+              <a:rPr lang="en-US" dirty="0" smtClean="0"/>
+              <a:t>Testing Framework</a:t>
+            </a:r>
+          </a:p>
+          <a:p>
+            <a:pPr lvl="1"/>
+            <a:r>
+              <a:rPr lang="en-US" dirty="0" smtClean="0"/>
+              <a:t>Borrows from the Java community’s </a:t>
+            </a:r>
+            <a:r>
+              <a:rPr lang="en-US" dirty="0" err="1" smtClean="0"/>
+              <a:t>DbUnit</a:t>
+            </a:r>
+            <a:endParaRPr lang="en-US" dirty="0" smtClean="0"/>
+          </a:p>
+          <a:p>
+            <a:pPr lvl="1"/>
+            <a:r>
+              <a:rPr lang="en-US" dirty="0" smtClean="0"/>
+              <a:t>“.</a:t>
+            </a:r>
+            <a:r>
+              <a:rPr lang="en-US" dirty="0"/>
+              <a:t>NET library for managing database state during unit </a:t>
+            </a:r>
+            <a:r>
+              <a:rPr lang="en-US" dirty="0" smtClean="0"/>
+              <a:t>testing”</a:t>
+            </a:r>
+          </a:p>
+          <a:p>
+            <a:r>
+              <a:rPr lang="en-US" dirty="0"/>
+              <a:t>Apache License, Version </a:t>
+            </a:r>
+            <a:r>
+              <a:rPr lang="en-US" dirty="0" smtClean="0"/>
+              <a:t>2.0</a:t>
+            </a:r>
+          </a:p>
+          <a:p>
+            <a:pPr lvl="2"/>
+            <a:r>
+              <a:rPr lang="en-US" dirty="0" smtClean="0"/>
+              <a:t>Free and Open Source</a:t>
+            </a:r>
+          </a:p>
+          <a:p>
+            <a:r>
               <a:rPr lang="en-US" dirty="0" err="1" smtClean="0"/>
               <a:t>NDbUnit</a:t>
             </a:r>
+            <a:r>
+              <a:rPr lang="en-US" dirty="0" smtClean="0"/>
+              <a:t> Project</a:t>
+            </a:r>
+          </a:p>
+          <a:p>
+            <a:pPr lvl="1"/>
+            <a:r>
+              <a:rPr lang="en-US" dirty="0" smtClean="0">
+                <a:hlinkClick r:id="rId3"/>
+              </a:rPr>
+              <a:t>http</a:t>
+            </a:r>
+            <a:r>
+              <a:rPr lang="en-US" dirty="0">
+                <a:hlinkClick r:id="rId3"/>
+              </a:rPr>
+              <a:t>://code.google.com/p/ndbunit</a:t>
+            </a:r>
+            <a:r>
+              <a:rPr lang="en-US" dirty="0" smtClean="0">
+                <a:hlinkClick r:id="rId3"/>
+              </a:rPr>
+              <a:t>/</a:t>
+            </a:r>
+            <a:r>
+              <a:rPr lang="en-US" dirty="0" smtClean="0"/>
+              <a:t> </a:t>
+            </a:r>
             <a:endParaRPr lang="en-US" dirty="0" smtClean="0"/>
           </a:p>
           <a:p>
-            <a:pPr lvl="1"/>
-            <a:r>
-              <a:rPr lang="en-US" dirty="0" smtClean="0"/>
-              <a:t>Database Testing Framework</a:t>
-            </a:r>
-          </a:p>
-          <a:p>
-            <a:pPr lvl="2"/>
-            <a:r>
-              <a:rPr lang="en-US" dirty="0" smtClean="0"/>
-              <a:t>Borrows from the Java community’s </a:t>
-            </a:r>
-            <a:r>
-              <a:rPr lang="en-US" dirty="0" err="1" smtClean="0"/>
-              <a:t>DbUnit</a:t>
-            </a:r>
-            <a:endParaRPr lang="en-US" dirty="0" smtClean="0"/>
-          </a:p>
-          <a:p>
-            <a:pPr lvl="2"/>
-            <a:r>
-              <a:rPr lang="en-US" dirty="0" smtClean="0"/>
-              <a:t>“.</a:t>
-            </a:r>
-            <a:r>
-              <a:rPr lang="en-US" dirty="0"/>
-              <a:t>NET library for managing database state during unit </a:t>
-            </a:r>
-            <a:r>
-              <a:rPr lang="en-US" dirty="0" smtClean="0"/>
-              <a:t>testing”</a:t>
-            </a:r>
-          </a:p>
-          <a:p>
-            <a:pPr lvl="1"/>
-            <a:r>
-              <a:rPr lang="en-US" dirty="0"/>
-              <a:t>Apache License, Version </a:t>
-            </a:r>
-            <a:r>
-              <a:rPr lang="en-US" dirty="0" smtClean="0"/>
-              <a:t>2.0</a:t>
-            </a:r>
-          </a:p>
-          <a:p>
-            <a:pPr lvl="2"/>
-            <a:r>
-              <a:rPr lang="en-US" dirty="0" smtClean="0"/>
-              <a:t>Free and Open Source</a:t>
-            </a:r>
-          </a:p>
-          <a:p>
-            <a:pPr lvl="1"/>
-            <a:r>
-              <a:rPr lang="en-US" dirty="0" err="1" smtClean="0"/>
-              <a:t>NDbUnit</a:t>
-            </a:r>
-            <a:r>
-              <a:rPr lang="en-US" dirty="0" smtClean="0"/>
-              <a:t> Project</a:t>
-            </a:r>
-          </a:p>
-          <a:p>
-            <a:pPr lvl="2"/>
-            <a:r>
-              <a:rPr lang="en-US" dirty="0" smtClean="0"/>
-              <a:t>http</a:t>
-            </a:r>
-            <a:r>
-              <a:rPr lang="en-US" dirty="0"/>
-              <a:t>://code.google.com/p/ndbunit</a:t>
-            </a:r>
-            <a:r>
-              <a:rPr lang="en-US" dirty="0" smtClean="0"/>
-              <a:t>/</a:t>
-            </a:r>
-          </a:p>
-          <a:p>
-            <a:pPr lvl="1"/>
             <a:r>
               <a:rPr lang="en-US" dirty="0" err="1" smtClean="0"/>
               <a:t>NuGet</a:t>
@@ -5087,25 +7069,33 @@
             </a:r>
           </a:p>
           <a:p>
-            <a:pPr lvl="2"/>
-            <a:r>
-              <a:rPr lang="en-US" dirty="0"/>
+            <a:pPr lvl="1"/>
+            <a:r>
+              <a:rPr lang="en-US" dirty="0">
+                <a:hlinkClick r:id="rId4"/>
+              </a:rPr>
               <a:t>http://</a:t>
             </a:r>
             <a:r>
-              <a:rPr lang="en-US" dirty="0" smtClean="0"/>
+              <a:rPr lang="en-US" dirty="0" smtClean="0">
+                <a:hlinkClick r:id="rId4"/>
+              </a:rPr>
               <a:t>nuget.org/packages?q=NDbUnit</a:t>
             </a:r>
+            <a:r>
+              <a:rPr lang="en-US" dirty="0" smtClean="0"/>
+              <a:t> </a:t>
+            </a:r>
+            <a:endParaRPr lang="en-US" dirty="0" smtClean="0"/>
+          </a:p>
+          <a:p>
+            <a:r>
+              <a:rPr lang="en-US" dirty="0" smtClean="0"/>
+              <a:t>Supports Many Databases</a:t>
+            </a:r>
           </a:p>
           <a:p>
             <a:pPr lvl="1"/>
-            <a:r>
-              <a:rPr lang="en-US" dirty="0" smtClean="0"/>
-              <a:t>Supports Many Databases</a:t>
-            </a:r>
-          </a:p>
-          <a:p>
-            <a:pPr lvl="2"/>
             <a:r>
               <a:rPr lang="en-US" dirty="0"/>
               <a:t>Microsoft SQL Server 2005 and 2008 (Express thru Enterprise</a:t>
@@ -5116,7 +7106,7 @@
             </a:r>
           </a:p>
           <a:p>
-            <a:pPr lvl="2"/>
+            <a:pPr lvl="1"/>
             <a:r>
               <a:rPr lang="en-US" dirty="0"/>
               <a:t>Oracle (XE thru Enterprise, 9i and later</a:t>
@@ -5127,7 +7117,7 @@
             </a:r>
           </a:p>
           <a:p>
-            <a:pPr lvl="2"/>
+            <a:pPr lvl="1"/>
             <a:r>
               <a:rPr lang="en-US" dirty="0" err="1"/>
               <a:t>SQLLite</a:t>
@@ -5145,7 +7135,7 @@
           <p:nvPr/>
         </p:nvPicPr>
         <p:blipFill>
-          <a:blip r:embed="rId3">
+          <a:blip r:embed="rId5">
             <a:extLst>
               <a:ext uri="{28A0092B-C50C-407E-A947-70E740481C1C}">
                 <a14:useLocalDpi xmlns:a14="http://schemas.microsoft.com/office/drawing/2010/main" val="0"/>
@@ -5169,371 +7159,7 @@
     </p:spTree>
     <p:extLst>
       <p:ext uri="{BB962C8B-B14F-4D97-AF65-F5344CB8AC3E}">
-        <p14:creationId xmlns:p14="http://schemas.microsoft.com/office/powerpoint/2010/main" val="53802294"/>
-      </p:ext>
-    </p:extLst>
-  </p:cSld>
-  <p:clrMapOvr>
-    <a:masterClrMapping/>
-  </p:clrMapOvr>
-  <p:timing>
-    <p:tnLst>
-      <p:par>
-        <p:cTn id="1" dur="indefinite" restart="never" nodeType="tmRoot"/>
-      </p:par>
-    </p:tnLst>
-  </p:timing>
-</p:sld>
-</file>
-
-<file path=ppt/slides/slide7.xml><?xml version="1.0" encoding="utf-8"?>
-<p:sld xmlns:a="http://schemas.openxmlformats.org/drawingml/2006/main" xmlns:r="http://schemas.openxmlformats.org/officeDocument/2006/relationships" xmlns:p="http://schemas.openxmlformats.org/presentationml/2006/main">
-  <p:cSld>
-    <p:spTree>
-      <p:nvGrpSpPr>
-        <p:cNvPr id="1" name=""/>
-        <p:cNvGrpSpPr/>
-        <p:nvPr/>
-      </p:nvGrpSpPr>
-      <p:grpSpPr>
-        <a:xfrm>
-          <a:off x="0" y="0"/>
-          <a:ext cx="0" cy="0"/>
-          <a:chOff x="0" y="0"/>
-          <a:chExt cx="0" cy="0"/>
-        </a:xfrm>
-      </p:grpSpPr>
-      <p:sp>
-        <p:nvSpPr>
-          <p:cNvPr id="2" name="Title 1"/>
-          <p:cNvSpPr>
-            <a:spLocks noGrp="1"/>
-          </p:cNvSpPr>
-          <p:nvPr>
-            <p:ph type="title"/>
-          </p:nvPr>
-        </p:nvSpPr>
-        <p:spPr/>
-        <p:txBody>
-          <a:bodyPr/>
-          <a:lstStyle/>
-          <a:p>
-            <a:r>
-              <a:rPr lang="en-US" dirty="0" smtClean="0"/>
-              <a:t>Tell Me More …</a:t>
-            </a:r>
-            <a:endParaRPr lang="en-US" dirty="0"/>
-          </a:p>
-        </p:txBody>
-      </p:sp>
-      <p:sp>
-        <p:nvSpPr>
-          <p:cNvPr id="3" name="Content Placeholder 2"/>
-          <p:cNvSpPr>
-            <a:spLocks noGrp="1"/>
-          </p:cNvSpPr>
-          <p:nvPr>
-            <p:ph idx="1"/>
-          </p:nvPr>
-        </p:nvSpPr>
-        <p:spPr/>
-        <p:txBody>
-          <a:bodyPr/>
-          <a:lstStyle/>
-          <a:p>
-            <a:r>
-              <a:rPr lang="en-US" dirty="0" smtClean="0"/>
-              <a:t>How does </a:t>
-            </a:r>
-            <a:r>
-              <a:rPr lang="en-US" dirty="0" err="1" smtClean="0"/>
-              <a:t>NDbUnit</a:t>
-            </a:r>
-            <a:r>
-              <a:rPr lang="en-US" dirty="0" smtClean="0"/>
-              <a:t> work?</a:t>
-            </a:r>
-          </a:p>
-          <a:p>
-            <a:endParaRPr lang="en-US" dirty="0"/>
-          </a:p>
-          <a:p>
-            <a:r>
-              <a:rPr lang="en-US" dirty="0" smtClean="0"/>
-              <a:t>Perhaps </a:t>
-            </a:r>
-            <a:r>
-              <a:rPr lang="en-US" dirty="0"/>
-              <a:t>an example would be helpful …</a:t>
-            </a:r>
-          </a:p>
-        </p:txBody>
-      </p:sp>
-    </p:spTree>
-    <p:extLst>
-      <p:ext uri="{BB962C8B-B14F-4D97-AF65-F5344CB8AC3E}">
-        <p14:creationId xmlns:p14="http://schemas.microsoft.com/office/powerpoint/2010/main" val="862202464"/>
-      </p:ext>
-    </p:extLst>
-  </p:cSld>
-  <p:clrMapOvr>
-    <a:masterClrMapping/>
-  </p:clrMapOvr>
-  <p:timing>
-    <p:tnLst>
-      <p:par>
-        <p:cTn id="1" dur="indefinite" restart="never" nodeType="tmRoot"/>
-      </p:par>
-    </p:tnLst>
-  </p:timing>
-</p:sld>
-</file>
-
-<file path=ppt/slides/slide8.xml><?xml version="1.0" encoding="utf-8"?>
-<p:sld xmlns:a="http://schemas.openxmlformats.org/drawingml/2006/main" xmlns:r="http://schemas.openxmlformats.org/officeDocument/2006/relationships" xmlns:p="http://schemas.openxmlformats.org/presentationml/2006/main">
-  <p:cSld>
-    <p:spTree>
-      <p:nvGrpSpPr>
-        <p:cNvPr id="1" name=""/>
-        <p:cNvGrpSpPr/>
-        <p:nvPr/>
-      </p:nvGrpSpPr>
-      <p:grpSpPr>
-        <a:xfrm>
-          <a:off x="0" y="0"/>
-          <a:ext cx="0" cy="0"/>
-          <a:chOff x="0" y="0"/>
-          <a:chExt cx="0" cy="0"/>
-        </a:xfrm>
-      </p:grpSpPr>
-      <p:sp>
-        <p:nvSpPr>
-          <p:cNvPr id="2" name="Title 1"/>
-          <p:cNvSpPr>
-            <a:spLocks noGrp="1"/>
-          </p:cNvSpPr>
-          <p:nvPr>
-            <p:ph type="title"/>
-          </p:nvPr>
-        </p:nvSpPr>
-        <p:spPr/>
-        <p:txBody>
-          <a:bodyPr/>
-          <a:lstStyle/>
-          <a:p>
-            <a:r>
-              <a:rPr lang="en-US" dirty="0"/>
-              <a:t>Unit Testing Databases Is Difficult</a:t>
-            </a:r>
-          </a:p>
-        </p:txBody>
-      </p:sp>
-      <p:sp>
-        <p:nvSpPr>
-          <p:cNvPr id="3" name="Content Placeholder 2"/>
-          <p:cNvSpPr>
-            <a:spLocks noGrp="1"/>
-          </p:cNvSpPr>
-          <p:nvPr>
-            <p:ph idx="1"/>
-          </p:nvPr>
-        </p:nvSpPr>
-        <p:spPr/>
-        <p:txBody>
-          <a:bodyPr/>
-          <a:lstStyle/>
-          <a:p>
-            <a:r>
-              <a:rPr lang="en-US" dirty="0"/>
-              <a:t>Unit Testing Databases Is Difficult</a:t>
-            </a:r>
-          </a:p>
-          <a:p>
-            <a:pPr lvl="1"/>
-            <a:r>
-              <a:rPr lang="en-US" dirty="0"/>
-              <a:t>CRUD Operations on Tables</a:t>
-            </a:r>
-          </a:p>
-          <a:p>
-            <a:pPr lvl="1"/>
-            <a:r>
-              <a:rPr lang="en-US" dirty="0"/>
-              <a:t>Complex Querying of Multiple Tables</a:t>
-            </a:r>
-          </a:p>
-          <a:p>
-            <a:pPr lvl="1"/>
-            <a:r>
-              <a:rPr lang="en-US" dirty="0"/>
-              <a:t>Views</a:t>
-            </a:r>
-          </a:p>
-          <a:p>
-            <a:pPr lvl="1"/>
-            <a:r>
-              <a:rPr lang="en-US" dirty="0"/>
-              <a:t>Functions</a:t>
-            </a:r>
-          </a:p>
-          <a:p>
-            <a:pPr lvl="1"/>
-            <a:r>
-              <a:rPr lang="en-US" dirty="0"/>
-              <a:t>Stored Procedures</a:t>
-            </a:r>
-          </a:p>
-          <a:p>
-            <a:pPr lvl="1"/>
-            <a:r>
-              <a:rPr lang="en-US" dirty="0"/>
-              <a:t>Triggers </a:t>
-            </a:r>
-            <a:r>
-              <a:rPr lang="en-US" dirty="0" smtClean="0"/>
-              <a:t>!?!</a:t>
-            </a:r>
-          </a:p>
-          <a:p>
-            <a:endParaRPr lang="en-US" dirty="0" smtClean="0"/>
-          </a:p>
-          <a:p>
-            <a:r>
-              <a:rPr lang="en-US" dirty="0" smtClean="0"/>
-              <a:t>Perhaps </a:t>
-            </a:r>
-            <a:r>
-              <a:rPr lang="en-US" dirty="0"/>
-              <a:t>an example would be helpful …</a:t>
-            </a:r>
-          </a:p>
-        </p:txBody>
-      </p:sp>
-    </p:spTree>
-    <p:extLst>
-      <p:ext uri="{BB962C8B-B14F-4D97-AF65-F5344CB8AC3E}">
-        <p14:creationId xmlns:p14="http://schemas.microsoft.com/office/powerpoint/2010/main" val="2158681476"/>
-      </p:ext>
-    </p:extLst>
-  </p:cSld>
-  <p:clrMapOvr>
-    <a:masterClrMapping/>
-  </p:clrMapOvr>
-  <p:timing>
-    <p:tnLst>
-      <p:par>
-        <p:cTn id="1" dur="indefinite" restart="never" nodeType="tmRoot"/>
-      </p:par>
-    </p:tnLst>
-  </p:timing>
-</p:sld>
-</file>
-
-<file path=ppt/slides/slide9.xml><?xml version="1.0" encoding="utf-8"?>
-<p:sld xmlns:a="http://schemas.openxmlformats.org/drawingml/2006/main" xmlns:r="http://schemas.openxmlformats.org/officeDocument/2006/relationships" xmlns:p="http://schemas.openxmlformats.org/presentationml/2006/main">
-  <p:cSld>
-    <p:spTree>
-      <p:nvGrpSpPr>
-        <p:cNvPr id="1" name=""/>
-        <p:cNvGrpSpPr/>
-        <p:nvPr/>
-      </p:nvGrpSpPr>
-      <p:grpSpPr>
-        <a:xfrm>
-          <a:off x="0" y="0"/>
-          <a:ext cx="0" cy="0"/>
-          <a:chOff x="0" y="0"/>
-          <a:chExt cx="0" cy="0"/>
-        </a:xfrm>
-      </p:grpSpPr>
-      <p:sp>
-        <p:nvSpPr>
-          <p:cNvPr id="2" name="Title 1"/>
-          <p:cNvSpPr>
-            <a:spLocks noGrp="1"/>
-          </p:cNvSpPr>
-          <p:nvPr>
-            <p:ph type="title"/>
-          </p:nvPr>
-        </p:nvSpPr>
-        <p:spPr/>
-        <p:txBody>
-          <a:bodyPr/>
-          <a:lstStyle/>
-          <a:p>
-            <a:r>
-              <a:rPr lang="en-US" dirty="0"/>
-              <a:t>Automated Integration Testing With Databases Is </a:t>
-            </a:r>
-            <a:r>
-              <a:rPr lang="en-US" i="1" dirty="0"/>
-              <a:t>Really</a:t>
-            </a:r>
-            <a:r>
-              <a:rPr lang="en-US" dirty="0"/>
-              <a:t> Difficult</a:t>
-            </a:r>
-          </a:p>
-        </p:txBody>
-      </p:sp>
-      <p:sp>
-        <p:nvSpPr>
-          <p:cNvPr id="3" name="Content Placeholder 2"/>
-          <p:cNvSpPr>
-            <a:spLocks noGrp="1"/>
-          </p:cNvSpPr>
-          <p:nvPr>
-            <p:ph idx="1"/>
-          </p:nvPr>
-        </p:nvSpPr>
-        <p:spPr/>
-        <p:txBody>
-          <a:bodyPr/>
-          <a:lstStyle/>
-          <a:p>
-            <a:r>
-              <a:rPr lang="en-US" dirty="0" smtClean="0"/>
-              <a:t>Automated </a:t>
-            </a:r>
-            <a:r>
-              <a:rPr lang="en-US" dirty="0"/>
-              <a:t>Integration Testing With Databases Is </a:t>
-            </a:r>
-            <a:r>
-              <a:rPr lang="en-US" i="1" dirty="0"/>
-              <a:t>Really</a:t>
-            </a:r>
-            <a:r>
-              <a:rPr lang="en-US" dirty="0"/>
-              <a:t> Difficult</a:t>
-            </a:r>
-          </a:p>
-          <a:p>
-            <a:pPr lvl="1"/>
-            <a:r>
-              <a:rPr lang="en-US" dirty="0"/>
-              <a:t>“Data Not In Known-State Before Test”</a:t>
-            </a:r>
-          </a:p>
-          <a:p>
-            <a:endParaRPr lang="en-US" dirty="0" smtClean="0"/>
-          </a:p>
-          <a:p>
-            <a:r>
-              <a:rPr lang="en-US" dirty="0" smtClean="0"/>
-              <a:t>Perhaps </a:t>
-            </a:r>
-            <a:r>
-              <a:rPr lang="en-US" dirty="0"/>
-              <a:t>an example would be helpful …</a:t>
-            </a:r>
-          </a:p>
-        </p:txBody>
-      </p:sp>
-    </p:spTree>
-    <p:extLst>
-      <p:ext uri="{BB962C8B-B14F-4D97-AF65-F5344CB8AC3E}">
-        <p14:creationId xmlns:p14="http://schemas.microsoft.com/office/powerpoint/2010/main" val="3925464999"/>
+        <p14:creationId xmlns:p14="http://schemas.microsoft.com/office/powerpoint/2010/main" val="3445732395"/>
       </p:ext>
     </p:extLst>
   </p:cSld>
@@ -6962,7 +8588,12 @@
 </file>
 
 <file path=customXml/item1.xml><?xml version="1.0" encoding="utf-8"?>
-<LongProperties xmlns="http://schemas.microsoft.com/office/2006/metadata/longProperties"/>
+<?mso-contentType ?>
+<FormTemplates xmlns="http://schemas.microsoft.com/sharepoint/v3/contenttype/forms">
+  <Display>DocumentLibraryForm</Display>
+  <Edit>DocumentLibraryForm</Edit>
+  <New>DocumentLibraryForm</New>
+</FormTemplates>
 </file>
 
 <file path=customXml/item2.xml><?xml version="1.0" encoding="utf-8"?>
@@ -6972,12 +8603,7 @@
 </file>
 
 <file path=customXml/item3.xml><?xml version="1.0" encoding="utf-8"?>
-<?mso-contentType ?>
-<FormTemplates xmlns="http://schemas.microsoft.com/sharepoint/v3/contenttype/forms">
-  <Display>DocumentLibraryForm</Display>
-  <Edit>DocumentLibraryForm</Edit>
-  <New>DocumentLibraryForm</New>
-</FormTemplates>
+<LongProperties xmlns="http://schemas.microsoft.com/office/2006/metadata/longProperties"/>
 </file>
 
 <file path=customXml/item4.xml><?xml version="1.0" encoding="utf-8"?>
@@ -7030,9 +8656,9 @@
 </file>
 
 <file path=customXml/itemProps1.xml><?xml version="1.0" encoding="utf-8"?>
-<ds:datastoreItem xmlns:ds="http://schemas.openxmlformats.org/officeDocument/2006/customXml" ds:itemID="{C13986F2-2813-470E-828A-8D5702178ABB}">
+<ds:datastoreItem xmlns:ds="http://schemas.openxmlformats.org/officeDocument/2006/customXml" ds:itemID="{6B6AE0AA-FA39-478D-9CD3-6A3092A1C572}">
   <ds:schemaRefs>
-    <ds:schemaRef ds:uri="http://schemas.microsoft.com/office/2006/metadata/longProperties"/>
+    <ds:schemaRef ds:uri="http://schemas.microsoft.com/sharepoint/v3/contenttype/forms"/>
   </ds:schemaRefs>
 </ds:datastoreItem>
 </file>
@@ -7052,9 +8678,9 @@
 </file>
 
 <file path=customXml/itemProps3.xml><?xml version="1.0" encoding="utf-8"?>
-<ds:datastoreItem xmlns:ds="http://schemas.openxmlformats.org/officeDocument/2006/customXml" ds:itemID="{6B6AE0AA-FA39-478D-9CD3-6A3092A1C572}">
+<ds:datastoreItem xmlns:ds="http://schemas.openxmlformats.org/officeDocument/2006/customXml" ds:itemID="{C13986F2-2813-470E-828A-8D5702178ABB}">
   <ds:schemaRefs>
-    <ds:schemaRef ds:uri="http://schemas.microsoft.com/sharepoint/v3/contenttype/forms"/>
+    <ds:schemaRef ds:uri="http://schemas.microsoft.com/office/2006/metadata/longProperties"/>
   </ds:schemaRefs>
 </ds:datastoreItem>
 </file>

</xml_diff>